<commit_message>
stripped out java/node/php stuff, took a quick pass at modifying slides
</commit_message>
<xml_diff>
--- a/02/02.pptx
+++ b/02/02.pptx
@@ -6,10 +6,10 @@
     <p:sldMasterId id="2147483684" r:id="rId2"/>
   </p:sldMasterIdLst>
   <p:notesMasterIdLst>
-    <p:notesMasterId r:id="rId19"/>
+    <p:notesMasterId r:id="rId17"/>
   </p:notesMasterIdLst>
   <p:handoutMasterIdLst>
-    <p:handoutMasterId r:id="rId20"/>
+    <p:handoutMasterId r:id="rId18"/>
   </p:handoutMasterIdLst>
   <p:sldIdLst>
     <p:sldId id="444" r:id="rId3"/>
@@ -25,9 +25,7 @@
     <p:sldId id="496" r:id="rId13"/>
     <p:sldId id="495" r:id="rId14"/>
     <p:sldId id="490" r:id="rId15"/>
-    <p:sldId id="491" r:id="rId16"/>
-    <p:sldId id="492" r:id="rId17"/>
-    <p:sldId id="484" r:id="rId18"/>
+    <p:sldId id="484" r:id="rId16"/>
   </p:sldIdLst>
   <p:sldSz cx="9144000" cy="5143500" type="screen16x9"/>
   <p:notesSz cx="6858000" cy="9144000"/>
@@ -144,8 +142,6 @@
             <p14:sldId id="496"/>
             <p14:sldId id="495"/>
             <p14:sldId id="490"/>
-            <p14:sldId id="491"/>
-            <p14:sldId id="492"/>
             <p14:sldId id="484"/>
           </p14:sldIdLst>
         </p14:section>
@@ -275,7 +271,7 @@
           <a:p>
             <a:fld id="{B5389E1E-C654-E943-9883-792E99AD7287}" type="datetimeFigureOut">
               <a:rPr lang="en-US" smtClean="0"/>
-              <a:t>10/25/2016</a:t>
+              <a:t>2/13/2017</a:t>
             </a:fld>
             <a:endParaRPr lang="en-US"/>
           </a:p>
@@ -441,7 +437,7 @@
           <a:p>
             <a:fld id="{9920D99B-2862-464A-984E-65BFC5FC0BBC}" type="datetimeFigureOut">
               <a:rPr lang="en-US" smtClean="0"/>
-              <a:t>10/25/2016</a:t>
+              <a:t>2/13/2017</a:t>
             </a:fld>
             <a:endParaRPr lang="en-US"/>
           </a:p>
@@ -7064,8 +7060,16 @@
           <a:lstStyle/>
           <a:p>
             <a:r>
+              <a:rPr lang="en-US" sz="3600"/>
+              <a:t>Workshop </a:t>
+            </a:r>
+            <a:r>
+              <a:rPr lang="en-US" sz="3600" smtClean="0"/>
+              <a:t>B </a:t>
+            </a:r>
+            <a:r>
               <a:rPr lang="en-US" sz="3600" dirty="0"/>
-              <a:t>Workshop 2 – Using </a:t>
+              <a:t>– Using </a:t>
             </a:r>
             <a:r>
               <a:rPr lang="en-US" sz="3600" dirty="0" err="1"/>
@@ -7835,9 +7839,15 @@
               <a:rPr lang="en-US" sz="1800" dirty="0">
                 <a:hlinkClick r:id="rId2"/>
               </a:rPr>
-              <a:t>https://github.com/couchbaselabs/workshop/tree/master/connect2016/developer/02</a:t>
-            </a:r>
-            <a:endParaRPr lang="en-US" sz="1800" dirty="0"/>
+              <a:t>https://</a:t>
+            </a:r>
+            <a:r>
+              <a:rPr lang="en-US" sz="1800" dirty="0" smtClean="0">
+                <a:hlinkClick r:id="rId2"/>
+              </a:rPr>
+              <a:t>github.com/couchbaselabs/aspnet-nosql-workshop/tree/master/02</a:t>
+            </a:r>
+            <a:endParaRPr lang="en-US" sz="1800" dirty="0" smtClean="0"/>
           </a:p>
           <a:p>
             <a:pPr marL="342900" indent="-342900">
@@ -7852,10 +7862,13 @@
               <a:buChar char="•"/>
             </a:pPr>
             <a:r>
-              <a:rPr lang="en-US" dirty="0" err="1"/>
-              <a:t>dotnet</a:t>
-            </a:r>
-            <a:endParaRPr lang="en-US" dirty="0"/>
+              <a:rPr lang="en-US" dirty="0" err="1" smtClean="0"/>
+              <a:t>dotnet_workshop</a:t>
+            </a:r>
+            <a:r>
+              <a:rPr lang="en-US" dirty="0" smtClean="0"/>
+              <a:t> (incomplete)</a:t>
+            </a:r>
           </a:p>
           <a:p>
             <a:pPr marL="342900" indent="-342900">
@@ -7863,19 +7876,14 @@
               <a:buChar char="•"/>
             </a:pPr>
             <a:r>
-              <a:rPr lang="en-US" dirty="0"/>
-              <a:t>java</a:t>
-            </a:r>
-          </a:p>
-          <a:p>
-            <a:pPr marL="342900" indent="-342900">
-              <a:buFont typeface="Arial" charset="0"/>
-              <a:buChar char="•"/>
-            </a:pPr>
-            <a:r>
-              <a:rPr lang="en-US" dirty="0"/>
-              <a:t>node</a:t>
-            </a:r>
+              <a:rPr lang="en-US" dirty="0" err="1" smtClean="0"/>
+              <a:t>dotnet</a:t>
+            </a:r>
+            <a:r>
+              <a:rPr lang="en-US" dirty="0" smtClean="0"/>
+              <a:t> (complete)</a:t>
+            </a:r>
+            <a:endParaRPr lang="en-US" dirty="0"/>
           </a:p>
           <a:p>
             <a:pPr marL="342900" indent="-342900">
@@ -7918,13 +7926,8 @@
             </a:pPr>
             <a:r>
               <a:rPr lang="en-US" dirty="0"/>
-              <a:t>Fill in </a:t>
-            </a:r>
-            <a:r>
-              <a:rPr lang="en-US"/>
-              <a:t>the blanks: look for “TODO”</a:t>
-            </a:r>
-            <a:endParaRPr lang="en-US" dirty="0"/>
+              <a:t>Fill in the blanks: look for “TODO”</a:t>
+            </a:r>
           </a:p>
           <a:p>
             <a:endParaRPr lang="en-US" dirty="0"/>
@@ -9161,2870 +9164,6 @@
             <a:spLocks noGrp="1"/>
           </p:cNvSpPr>
           <p:nvPr>
-            <p:ph type="title"/>
-          </p:nvPr>
-        </p:nvSpPr>
-        <p:spPr/>
-        <p:txBody>
-          <a:bodyPr/>
-          <a:lstStyle/>
-          <a:p>
-            <a:r>
-              <a:rPr lang="en-US" dirty="0"/>
-              <a:t>SDK: Node</a:t>
-            </a:r>
-          </a:p>
-        </p:txBody>
-      </p:sp>
-      <p:sp>
-        <p:nvSpPr>
-          <p:cNvPr id="3" name="Content Placeholder 2"/>
-          <p:cNvSpPr txBox="1">
-            <a:spLocks/>
-          </p:cNvSpPr>
-          <p:nvPr/>
-        </p:nvSpPr>
-        <p:spPr>
-          <a:xfrm>
-            <a:off x="609600" y="676275"/>
-            <a:ext cx="8007739" cy="2009775"/>
-          </a:xfrm>
-          <a:prstGeom prst="rect">
-            <a:avLst/>
-          </a:prstGeom>
-        </p:spPr>
-        <p:txBody>
-          <a:bodyPr/>
-          <a:lstStyle>
-            <a:lvl1pPr marL="228600" indent="-228600" algn="l" defTabSz="457200" rtl="0" eaLnBrk="1" latinLnBrk="0" hangingPunct="1">
-              <a:spcBef>
-                <a:spcPts val="0"/>
-              </a:spcBef>
-              <a:buClr>
-                <a:schemeClr val="accent1"/>
-              </a:buClr>
-              <a:buFont typeface="Wingdings" charset="2"/>
-              <a:buChar char="§"/>
-              <a:defRPr sz="2400" kern="1200">
-                <a:solidFill>
-                  <a:schemeClr val="tx1"/>
-                </a:solidFill>
-                <a:latin typeface="+mn-lt"/>
-                <a:ea typeface="+mn-ea"/>
-                <a:cs typeface="+mn-cs"/>
-              </a:defRPr>
-            </a:lvl1pPr>
-            <a:lvl2pPr marL="455613" indent="-227013" algn="l" defTabSz="457200" rtl="0" eaLnBrk="1" latinLnBrk="0" hangingPunct="1">
-              <a:spcBef>
-                <a:spcPts val="0"/>
-              </a:spcBef>
-              <a:buClr>
-                <a:srgbClr val="262626"/>
-              </a:buClr>
-              <a:buFont typeface="Wingdings" charset="2"/>
-              <a:buChar char="§"/>
-              <a:defRPr sz="2000" kern="1200">
-                <a:solidFill>
-                  <a:schemeClr val="tx1"/>
-                </a:solidFill>
-                <a:latin typeface="+mn-lt"/>
-                <a:ea typeface="+mn-ea"/>
-                <a:cs typeface="+mn-cs"/>
-              </a:defRPr>
-            </a:lvl2pPr>
-            <a:lvl3pPr marL="455613" indent="-228600" algn="l" defTabSz="457200" rtl="0" eaLnBrk="1" latinLnBrk="0" hangingPunct="1">
-              <a:spcBef>
-                <a:spcPts val="0"/>
-              </a:spcBef>
-              <a:buClr>
-                <a:srgbClr val="262626"/>
-              </a:buClr>
-              <a:buFont typeface="Wingdings" charset="2"/>
-              <a:buChar char="§"/>
-              <a:defRPr sz="2000" kern="1200">
-                <a:solidFill>
-                  <a:schemeClr val="tx1"/>
-                </a:solidFill>
-                <a:latin typeface="+mn-lt"/>
-                <a:ea typeface="+mn-ea"/>
-                <a:cs typeface="+mn-cs"/>
-              </a:defRPr>
-            </a:lvl3pPr>
-            <a:lvl4pPr marL="455613" indent="-228600" algn="l" defTabSz="457200" rtl="0" eaLnBrk="1" latinLnBrk="0" hangingPunct="1">
-              <a:spcBef>
-                <a:spcPts val="0"/>
-              </a:spcBef>
-              <a:buClr>
-                <a:srgbClr val="262626"/>
-              </a:buClr>
-              <a:buFont typeface="Wingdings" charset="2"/>
-              <a:buChar char="§"/>
-              <a:defRPr sz="2000" kern="1200">
-                <a:solidFill>
-                  <a:schemeClr val="tx1"/>
-                </a:solidFill>
-                <a:latin typeface="+mn-lt"/>
-                <a:ea typeface="+mn-ea"/>
-                <a:cs typeface="+mn-cs"/>
-              </a:defRPr>
-            </a:lvl4pPr>
-            <a:lvl5pPr marL="455613" indent="-228600" algn="l" defTabSz="457200" rtl="0" eaLnBrk="1" latinLnBrk="0" hangingPunct="1">
-              <a:spcBef>
-                <a:spcPts val="200"/>
-              </a:spcBef>
-              <a:buClr>
-                <a:srgbClr val="262626"/>
-              </a:buClr>
-              <a:buFont typeface="Wingdings" charset="2"/>
-              <a:buChar char="§"/>
-              <a:defRPr sz="2000" kern="1200">
-                <a:solidFill>
-                  <a:schemeClr val="tx1"/>
-                </a:solidFill>
-                <a:latin typeface="+mn-lt"/>
-                <a:ea typeface="+mn-ea"/>
-                <a:cs typeface="+mn-cs"/>
-              </a:defRPr>
-            </a:lvl5pPr>
-            <a:lvl6pPr marL="2514600" indent="-228600" algn="l" defTabSz="457200" rtl="0" eaLnBrk="1" latinLnBrk="0" hangingPunct="1">
-              <a:spcBef>
-                <a:spcPct val="20000"/>
-              </a:spcBef>
-              <a:buFont typeface="Arial"/>
-              <a:buChar char="•"/>
-              <a:defRPr sz="2000" kern="1200">
-                <a:solidFill>
-                  <a:schemeClr val="tx1"/>
-                </a:solidFill>
-                <a:latin typeface="+mn-lt"/>
-                <a:ea typeface="+mn-ea"/>
-                <a:cs typeface="+mn-cs"/>
-              </a:defRPr>
-            </a:lvl6pPr>
-            <a:lvl7pPr marL="2971800" indent="-228600" algn="l" defTabSz="457200" rtl="0" eaLnBrk="1" latinLnBrk="0" hangingPunct="1">
-              <a:spcBef>
-                <a:spcPct val="20000"/>
-              </a:spcBef>
-              <a:buFont typeface="Arial"/>
-              <a:buChar char="•"/>
-              <a:defRPr sz="2000" kern="1200">
-                <a:solidFill>
-                  <a:schemeClr val="tx1"/>
-                </a:solidFill>
-                <a:latin typeface="+mn-lt"/>
-                <a:ea typeface="+mn-ea"/>
-                <a:cs typeface="+mn-cs"/>
-              </a:defRPr>
-            </a:lvl7pPr>
-            <a:lvl8pPr marL="3429000" indent="-228600" algn="l" defTabSz="457200" rtl="0" eaLnBrk="1" latinLnBrk="0" hangingPunct="1">
-              <a:spcBef>
-                <a:spcPct val="20000"/>
-              </a:spcBef>
-              <a:buFont typeface="Arial"/>
-              <a:buChar char="•"/>
-              <a:defRPr sz="2000" kern="1200">
-                <a:solidFill>
-                  <a:schemeClr val="tx1"/>
-                </a:solidFill>
-                <a:latin typeface="+mn-lt"/>
-                <a:ea typeface="+mn-ea"/>
-                <a:cs typeface="+mn-cs"/>
-              </a:defRPr>
-            </a:lvl8pPr>
-            <a:lvl9pPr marL="3886200" indent="-228600" algn="l" defTabSz="457200" rtl="0" eaLnBrk="1" latinLnBrk="0" hangingPunct="1">
-              <a:spcBef>
-                <a:spcPct val="20000"/>
-              </a:spcBef>
-              <a:buFont typeface="Arial"/>
-              <a:buChar char="•"/>
-              <a:defRPr sz="2000" kern="1200">
-                <a:solidFill>
-                  <a:schemeClr val="tx1"/>
-                </a:solidFill>
-                <a:latin typeface="+mn-lt"/>
-                <a:ea typeface="+mn-ea"/>
-                <a:cs typeface="+mn-cs"/>
-              </a:defRPr>
-            </a:lvl9pPr>
-          </a:lstStyle>
-          <a:p>
-            <a:pPr marL="342900" indent="-342900">
-              <a:buFont typeface="Arial" charset="0"/>
-              <a:buChar char="•"/>
-            </a:pPr>
-            <a:r>
-              <a:rPr lang="en-US" dirty="0"/>
-              <a:t>How to install</a:t>
-            </a:r>
-          </a:p>
-          <a:p>
-            <a:pPr marL="342900" indent="-342900">
-              <a:buFont typeface="Arial" charset="0"/>
-              <a:buChar char="•"/>
-            </a:pPr>
-            <a:endParaRPr lang="en-US" dirty="0"/>
-          </a:p>
-          <a:p>
-            <a:pPr marL="569913" lvl="1" indent="-342900">
-              <a:buFont typeface="Arial" charset="0"/>
-              <a:buChar char="•"/>
-            </a:pPr>
-            <a:r>
-              <a:rPr lang="en-US" dirty="0" err="1"/>
-              <a:t>npm</a:t>
-            </a:r>
-            <a:r>
-              <a:rPr lang="en-US" dirty="0"/>
-              <a:t> install </a:t>
-            </a:r>
-            <a:r>
-              <a:rPr lang="en-US" dirty="0" err="1"/>
-              <a:t>couchbase</a:t>
-            </a:r>
-            <a:endParaRPr lang="en-US" dirty="0"/>
-          </a:p>
-          <a:p>
-            <a:pPr marL="569913" lvl="1" indent="-342900">
-              <a:buFont typeface="Arial" charset="0"/>
-              <a:buChar char="•"/>
-            </a:pPr>
-            <a:endParaRPr lang="en-US" dirty="0"/>
-          </a:p>
-          <a:p>
-            <a:pPr marL="342900" indent="-342900">
-              <a:buFont typeface="Arial" charset="0"/>
-              <a:buChar char="•"/>
-            </a:pPr>
-            <a:r>
-              <a:rPr lang="en-US" dirty="0"/>
-              <a:t>How to connect to a </a:t>
-            </a:r>
-            <a:r>
-              <a:rPr lang="en-US" dirty="0" err="1"/>
-              <a:t>Couchbase</a:t>
-            </a:r>
-            <a:r>
-              <a:rPr lang="en-US" dirty="0"/>
-              <a:t> cluster</a:t>
-            </a:r>
-          </a:p>
-          <a:p>
-            <a:pPr marL="342900" indent="-342900">
-              <a:buFont typeface="Arial" charset="0"/>
-              <a:buChar char="•"/>
-            </a:pPr>
-            <a:endParaRPr lang="en-US" dirty="0"/>
-          </a:p>
-          <a:p>
-            <a:pPr marL="342900" indent="-342900">
-              <a:buFont typeface="Arial" charset="0"/>
-              <a:buChar char="•"/>
-            </a:pPr>
-            <a:endParaRPr lang="en-US" dirty="0"/>
-          </a:p>
-          <a:p>
-            <a:endParaRPr lang="en-US" dirty="0"/>
-          </a:p>
-        </p:txBody>
-      </p:sp>
-      <p:sp>
-        <p:nvSpPr>
-          <p:cNvPr id="4" name="Shape 1658"/>
-          <p:cNvSpPr txBox="1">
-            <a:spLocks/>
-          </p:cNvSpPr>
-          <p:nvPr/>
-        </p:nvSpPr>
-        <p:spPr>
-          <a:xfrm>
-            <a:off x="1288661" y="2419349"/>
-            <a:ext cx="6236089" cy="2420551"/>
-          </a:xfrm>
-          <a:prstGeom prst="rect">
-            <a:avLst/>
-          </a:prstGeom>
-        </p:spPr>
-        <p:txBody>
-          <a:bodyPr lIns="0" tIns="0" rIns="0" bIns="0">
-            <a:noAutofit/>
-          </a:bodyPr>
-          <a:lstStyle>
-            <a:lvl1pPr marL="228600" indent="-228600" algn="l" defTabSz="457200" rtl="0" eaLnBrk="1" latinLnBrk="0" hangingPunct="1">
-              <a:spcBef>
-                <a:spcPts val="0"/>
-              </a:spcBef>
-              <a:buClr>
-                <a:schemeClr val="accent1"/>
-              </a:buClr>
-              <a:buFont typeface="Wingdings" charset="2"/>
-              <a:buChar char="§"/>
-              <a:defRPr sz="2400" kern="1200">
-                <a:solidFill>
-                  <a:schemeClr val="tx1"/>
-                </a:solidFill>
-                <a:latin typeface="+mn-lt"/>
-                <a:ea typeface="+mn-ea"/>
-                <a:cs typeface="+mn-cs"/>
-              </a:defRPr>
-            </a:lvl1pPr>
-            <a:lvl2pPr marL="455613" indent="-227013" algn="l" defTabSz="457200" rtl="0" eaLnBrk="1" latinLnBrk="0" hangingPunct="1">
-              <a:spcBef>
-                <a:spcPts val="0"/>
-              </a:spcBef>
-              <a:buClr>
-                <a:srgbClr val="262626"/>
-              </a:buClr>
-              <a:buFont typeface="Wingdings" charset="2"/>
-              <a:buChar char="§"/>
-              <a:defRPr sz="2000" kern="1200">
-                <a:solidFill>
-                  <a:schemeClr val="tx1"/>
-                </a:solidFill>
-                <a:latin typeface="+mn-lt"/>
-                <a:ea typeface="+mn-ea"/>
-                <a:cs typeface="+mn-cs"/>
-              </a:defRPr>
-            </a:lvl2pPr>
-            <a:lvl3pPr marL="455613" indent="-228600" algn="l" defTabSz="457200" rtl="0" eaLnBrk="1" latinLnBrk="0" hangingPunct="1">
-              <a:spcBef>
-                <a:spcPts val="0"/>
-              </a:spcBef>
-              <a:buClr>
-                <a:srgbClr val="262626"/>
-              </a:buClr>
-              <a:buFont typeface="Wingdings" charset="2"/>
-              <a:buChar char="§"/>
-              <a:defRPr sz="2000" kern="1200">
-                <a:solidFill>
-                  <a:schemeClr val="tx1"/>
-                </a:solidFill>
-                <a:latin typeface="+mn-lt"/>
-                <a:ea typeface="+mn-ea"/>
-                <a:cs typeface="+mn-cs"/>
-              </a:defRPr>
-            </a:lvl3pPr>
-            <a:lvl4pPr marL="455613" indent="-228600" algn="l" defTabSz="457200" rtl="0" eaLnBrk="1" latinLnBrk="0" hangingPunct="1">
-              <a:spcBef>
-                <a:spcPts val="0"/>
-              </a:spcBef>
-              <a:buClr>
-                <a:srgbClr val="262626"/>
-              </a:buClr>
-              <a:buFont typeface="Wingdings" charset="2"/>
-              <a:buChar char="§"/>
-              <a:defRPr sz="2000" kern="1200">
-                <a:solidFill>
-                  <a:schemeClr val="tx1"/>
-                </a:solidFill>
-                <a:latin typeface="+mn-lt"/>
-                <a:ea typeface="+mn-ea"/>
-                <a:cs typeface="+mn-cs"/>
-              </a:defRPr>
-            </a:lvl4pPr>
-            <a:lvl5pPr marL="455613" indent="-228600" algn="l" defTabSz="457200" rtl="0" eaLnBrk="1" latinLnBrk="0" hangingPunct="1">
-              <a:spcBef>
-                <a:spcPts val="200"/>
-              </a:spcBef>
-              <a:buClr>
-                <a:srgbClr val="262626"/>
-              </a:buClr>
-              <a:buFont typeface="Wingdings" charset="2"/>
-              <a:buChar char="§"/>
-              <a:defRPr sz="2000" kern="1200">
-                <a:solidFill>
-                  <a:schemeClr val="tx1"/>
-                </a:solidFill>
-                <a:latin typeface="+mn-lt"/>
-                <a:ea typeface="+mn-ea"/>
-                <a:cs typeface="+mn-cs"/>
-              </a:defRPr>
-            </a:lvl5pPr>
-            <a:lvl6pPr marL="2514600" indent="-228600" algn="l" defTabSz="457200" rtl="0" eaLnBrk="1" latinLnBrk="0" hangingPunct="1">
-              <a:spcBef>
-                <a:spcPct val="20000"/>
-              </a:spcBef>
-              <a:buFont typeface="Arial"/>
-              <a:buChar char="•"/>
-              <a:defRPr sz="2000" kern="1200">
-                <a:solidFill>
-                  <a:schemeClr val="tx1"/>
-                </a:solidFill>
-                <a:latin typeface="+mn-lt"/>
-                <a:ea typeface="+mn-ea"/>
-                <a:cs typeface="+mn-cs"/>
-              </a:defRPr>
-            </a:lvl6pPr>
-            <a:lvl7pPr marL="2971800" indent="-228600" algn="l" defTabSz="457200" rtl="0" eaLnBrk="1" latinLnBrk="0" hangingPunct="1">
-              <a:spcBef>
-                <a:spcPct val="20000"/>
-              </a:spcBef>
-              <a:buFont typeface="Arial"/>
-              <a:buChar char="•"/>
-              <a:defRPr sz="2000" kern="1200">
-                <a:solidFill>
-                  <a:schemeClr val="tx1"/>
-                </a:solidFill>
-                <a:latin typeface="+mn-lt"/>
-                <a:ea typeface="+mn-ea"/>
-                <a:cs typeface="+mn-cs"/>
-              </a:defRPr>
-            </a:lvl7pPr>
-            <a:lvl8pPr marL="3429000" indent="-228600" algn="l" defTabSz="457200" rtl="0" eaLnBrk="1" latinLnBrk="0" hangingPunct="1">
-              <a:spcBef>
-                <a:spcPct val="20000"/>
-              </a:spcBef>
-              <a:buFont typeface="Arial"/>
-              <a:buChar char="•"/>
-              <a:defRPr sz="2000" kern="1200">
-                <a:solidFill>
-                  <a:schemeClr val="tx1"/>
-                </a:solidFill>
-                <a:latin typeface="+mn-lt"/>
-                <a:ea typeface="+mn-ea"/>
-                <a:cs typeface="+mn-cs"/>
-              </a:defRPr>
-            </a:lvl8pPr>
-            <a:lvl9pPr marL="3886200" indent="-228600" algn="l" defTabSz="457200" rtl="0" eaLnBrk="1" latinLnBrk="0" hangingPunct="1">
-              <a:spcBef>
-                <a:spcPct val="20000"/>
-              </a:spcBef>
-              <a:buFont typeface="Arial"/>
-              <a:buChar char="•"/>
-              <a:defRPr sz="2000" kern="1200">
-                <a:solidFill>
-                  <a:schemeClr val="tx1"/>
-                </a:solidFill>
-                <a:latin typeface="+mn-lt"/>
-                <a:ea typeface="+mn-ea"/>
-                <a:cs typeface="+mn-cs"/>
-              </a:defRPr>
-            </a:lvl9pPr>
-          </a:lstStyle>
-          <a:p>
-            <a:pPr marL="0" indent="0">
-              <a:buNone/>
-              <a:defRPr sz="1800">
-                <a:solidFill>
-                  <a:srgbClr val="000000"/>
-                </a:solidFill>
-              </a:defRPr>
-            </a:pPr>
-            <a:r>
-              <a:rPr lang="en-US" sz="1100" dirty="0">
-                <a:solidFill>
-                  <a:srgbClr val="1BB2E2"/>
-                </a:solidFill>
-                <a:latin typeface="Courier" charset="0"/>
-                <a:ea typeface="Courier" charset="0"/>
-                <a:cs typeface="Courier" charset="0"/>
-                <a:sym typeface="Consolas"/>
-              </a:rPr>
-              <a:t>//including the Node.js dependency</a:t>
-            </a:r>
-          </a:p>
-          <a:p>
-            <a:pPr marL="0" indent="0">
-              <a:buNone/>
-              <a:defRPr sz="1800">
-                <a:solidFill>
-                  <a:srgbClr val="000000"/>
-                </a:solidFill>
-              </a:defRPr>
-            </a:pPr>
-            <a:r>
-              <a:rPr lang="en-US" sz="1100" dirty="0" err="1">
-                <a:solidFill>
-                  <a:srgbClr val="1E1C1C"/>
-                </a:solidFill>
-                <a:latin typeface="Courier" charset="0"/>
-                <a:ea typeface="Courier" charset="0"/>
-                <a:cs typeface="Courier" charset="0"/>
-                <a:sym typeface="Consolas"/>
-              </a:rPr>
-              <a:t>var</a:t>
-            </a:r>
-            <a:r>
-              <a:rPr lang="en-US" sz="1100" dirty="0">
-                <a:solidFill>
-                  <a:srgbClr val="1E1C1C"/>
-                </a:solidFill>
-                <a:latin typeface="Courier" charset="0"/>
-                <a:ea typeface="Courier" charset="0"/>
-                <a:cs typeface="Courier" charset="0"/>
-                <a:sym typeface="Consolas"/>
-              </a:rPr>
-              <a:t> </a:t>
-            </a:r>
-            <a:r>
-              <a:rPr lang="en-US" sz="1100" dirty="0" err="1">
-                <a:solidFill>
-                  <a:srgbClr val="1E1C1C"/>
-                </a:solidFill>
-                <a:latin typeface="Courier" charset="0"/>
-                <a:ea typeface="Courier" charset="0"/>
-                <a:cs typeface="Courier" charset="0"/>
-                <a:sym typeface="Consolas"/>
-              </a:rPr>
-              <a:t>Couchbase</a:t>
-            </a:r>
-            <a:r>
-              <a:rPr lang="en-US" sz="1100" dirty="0">
-                <a:solidFill>
-                  <a:srgbClr val="1E1C1C"/>
-                </a:solidFill>
-                <a:latin typeface="Courier" charset="0"/>
-                <a:ea typeface="Courier" charset="0"/>
-                <a:cs typeface="Courier" charset="0"/>
-                <a:sym typeface="Consolas"/>
-              </a:rPr>
-              <a:t> = require(</a:t>
-            </a:r>
-            <a:r>
-              <a:rPr lang="en-US" sz="1100" dirty="0">
-                <a:solidFill>
-                  <a:srgbClr val="E40121"/>
-                </a:solidFill>
-                <a:latin typeface="Courier" charset="0"/>
-                <a:ea typeface="Courier" charset="0"/>
-                <a:cs typeface="Courier" charset="0"/>
-                <a:sym typeface="Consolas"/>
-              </a:rPr>
-              <a:t>”</a:t>
-            </a:r>
-            <a:r>
-              <a:rPr lang="en-US" sz="1100" dirty="0" err="1">
-                <a:solidFill>
-                  <a:srgbClr val="E40121"/>
-                </a:solidFill>
-                <a:latin typeface="Courier" charset="0"/>
-                <a:ea typeface="Courier" charset="0"/>
-                <a:cs typeface="Courier" charset="0"/>
-                <a:sym typeface="Consolas"/>
-              </a:rPr>
-              <a:t>couchbase</a:t>
-            </a:r>
-            <a:r>
-              <a:rPr lang="en-US" sz="1100" dirty="0">
-                <a:solidFill>
-                  <a:srgbClr val="E40121"/>
-                </a:solidFill>
-                <a:latin typeface="Courier" charset="0"/>
-                <a:ea typeface="Courier" charset="0"/>
-                <a:cs typeface="Courier" charset="0"/>
-                <a:sym typeface="Consolas"/>
-              </a:rPr>
-              <a:t>"</a:t>
-            </a:r>
-            <a:r>
-              <a:rPr lang="en-US" sz="1100" dirty="0">
-                <a:solidFill>
-                  <a:srgbClr val="1E1C1C"/>
-                </a:solidFill>
-                <a:latin typeface="Courier" charset="0"/>
-                <a:ea typeface="Courier" charset="0"/>
-                <a:cs typeface="Courier" charset="0"/>
-                <a:sym typeface="Consolas"/>
-              </a:rPr>
-              <a:t>);</a:t>
-            </a:r>
-          </a:p>
-          <a:p>
-            <a:pPr marL="0" indent="0">
-              <a:buNone/>
-              <a:defRPr sz="1800">
-                <a:solidFill>
-                  <a:srgbClr val="000000"/>
-                </a:solidFill>
-              </a:defRPr>
-            </a:pPr>
-            <a:endParaRPr lang="en-US" sz="1100" dirty="0">
-              <a:solidFill>
-                <a:srgbClr val="1E1C1C"/>
-              </a:solidFill>
-              <a:latin typeface="Courier" charset="0"/>
-              <a:ea typeface="Courier" charset="0"/>
-              <a:cs typeface="Courier" charset="0"/>
-              <a:sym typeface="Consolas"/>
-            </a:endParaRPr>
-          </a:p>
-          <a:p>
-            <a:pPr marL="0" indent="0">
-              <a:buNone/>
-              <a:defRPr sz="1800">
-                <a:solidFill>
-                  <a:srgbClr val="000000"/>
-                </a:solidFill>
-              </a:defRPr>
-            </a:pPr>
-            <a:r>
-              <a:rPr lang="en-US" sz="1100" dirty="0">
-                <a:solidFill>
-                  <a:srgbClr val="1BB2E2"/>
-                </a:solidFill>
-                <a:latin typeface="Courier" charset="0"/>
-                <a:ea typeface="Courier" charset="0"/>
-                <a:cs typeface="Courier" charset="0"/>
-                <a:sym typeface="Consolas"/>
-              </a:rPr>
-              <a:t>//connecting to a </a:t>
-            </a:r>
-            <a:r>
-              <a:rPr lang="en-US" sz="1100" dirty="0" err="1">
-                <a:solidFill>
-                  <a:srgbClr val="1BB2E2"/>
-                </a:solidFill>
-                <a:latin typeface="Courier" charset="0"/>
-                <a:ea typeface="Courier" charset="0"/>
-                <a:cs typeface="Courier" charset="0"/>
-                <a:sym typeface="Consolas"/>
-              </a:rPr>
-              <a:t>Couchbase</a:t>
-            </a:r>
-            <a:r>
-              <a:rPr lang="en-US" sz="1100" dirty="0">
-                <a:solidFill>
-                  <a:srgbClr val="1BB2E2"/>
-                </a:solidFill>
-                <a:latin typeface="Courier" charset="0"/>
-                <a:ea typeface="Courier" charset="0"/>
-                <a:cs typeface="Courier" charset="0"/>
-                <a:sym typeface="Consolas"/>
-              </a:rPr>
-              <a:t> cluster</a:t>
-            </a:r>
-          </a:p>
-          <a:p>
-            <a:pPr marL="0" indent="0">
-              <a:buNone/>
-              <a:defRPr sz="1800">
-                <a:solidFill>
-                  <a:srgbClr val="000000"/>
-                </a:solidFill>
-              </a:defRPr>
-            </a:pPr>
-            <a:r>
-              <a:rPr lang="en-US" sz="1100" dirty="0" err="1">
-                <a:solidFill>
-                  <a:srgbClr val="1E1C1C"/>
-                </a:solidFill>
-                <a:latin typeface="Courier" charset="0"/>
-                <a:ea typeface="Courier" charset="0"/>
-                <a:cs typeface="Courier" charset="0"/>
-                <a:sym typeface="Consolas"/>
-              </a:rPr>
-              <a:t>var</a:t>
-            </a:r>
-            <a:r>
-              <a:rPr lang="en-US" sz="1100" dirty="0">
-                <a:solidFill>
-                  <a:srgbClr val="1E1C1C"/>
-                </a:solidFill>
-                <a:latin typeface="Courier" charset="0"/>
-                <a:ea typeface="Courier" charset="0"/>
-                <a:cs typeface="Courier" charset="0"/>
-                <a:sym typeface="Consolas"/>
-              </a:rPr>
-              <a:t> cluster = new </a:t>
-            </a:r>
-            <a:r>
-              <a:rPr lang="en-US" sz="1100" dirty="0" err="1">
-                <a:solidFill>
-                  <a:srgbClr val="1E1C1C"/>
-                </a:solidFill>
-                <a:latin typeface="Courier" charset="0"/>
-                <a:ea typeface="Courier" charset="0"/>
-                <a:cs typeface="Courier" charset="0"/>
-                <a:sym typeface="Consolas"/>
-              </a:rPr>
-              <a:t>Couchbase.Cluster</a:t>
-            </a:r>
-            <a:r>
-              <a:rPr lang="en-US" sz="1100" dirty="0">
-                <a:solidFill>
-                  <a:srgbClr val="1E1C1C"/>
-                </a:solidFill>
-                <a:latin typeface="Courier" charset="0"/>
-                <a:ea typeface="Courier" charset="0"/>
-                <a:cs typeface="Courier" charset="0"/>
-                <a:sym typeface="Consolas"/>
-              </a:rPr>
-              <a:t>(</a:t>
-            </a:r>
-            <a:r>
-              <a:rPr lang="en-US" sz="1100" dirty="0">
-                <a:solidFill>
-                  <a:srgbClr val="E40121"/>
-                </a:solidFill>
-                <a:latin typeface="Courier" charset="0"/>
-                <a:ea typeface="Courier" charset="0"/>
-                <a:cs typeface="Courier" charset="0"/>
-                <a:sym typeface="Consolas"/>
-              </a:rPr>
-              <a:t>"</a:t>
-            </a:r>
-            <a:r>
-              <a:rPr lang="en-US" sz="1100" dirty="0" err="1">
-                <a:solidFill>
-                  <a:srgbClr val="E40121"/>
-                </a:solidFill>
-                <a:latin typeface="Courier" charset="0"/>
-                <a:ea typeface="Courier" charset="0"/>
-                <a:cs typeface="Courier" charset="0"/>
-                <a:sym typeface="Consolas"/>
-              </a:rPr>
-              <a:t>couchbase</a:t>
-            </a:r>
-            <a:r>
-              <a:rPr lang="en-US" sz="1100" dirty="0">
-                <a:solidFill>
-                  <a:srgbClr val="E40121"/>
-                </a:solidFill>
-                <a:latin typeface="Courier" charset="0"/>
-                <a:ea typeface="Courier" charset="0"/>
-                <a:cs typeface="Courier" charset="0"/>
-                <a:sym typeface="Consolas"/>
-              </a:rPr>
-              <a:t>://localhost:8091"</a:t>
-            </a:r>
-            <a:r>
-              <a:rPr lang="en-US" sz="1100" dirty="0">
-                <a:solidFill>
-                  <a:srgbClr val="1E1C1C"/>
-                </a:solidFill>
-                <a:latin typeface="Courier" charset="0"/>
-                <a:ea typeface="Courier" charset="0"/>
-                <a:cs typeface="Courier" charset="0"/>
-                <a:sym typeface="Consolas"/>
-              </a:rPr>
-              <a:t>);</a:t>
-            </a:r>
-          </a:p>
-          <a:p>
-            <a:pPr marL="0" indent="0">
-              <a:buNone/>
-              <a:defRPr sz="1800">
-                <a:solidFill>
-                  <a:srgbClr val="000000"/>
-                </a:solidFill>
-              </a:defRPr>
-            </a:pPr>
-            <a:endParaRPr lang="en-US" sz="1100" dirty="0">
-              <a:solidFill>
-                <a:srgbClr val="1E1C1C"/>
-              </a:solidFill>
-              <a:latin typeface="Courier" charset="0"/>
-              <a:ea typeface="Courier" charset="0"/>
-              <a:cs typeface="Courier" charset="0"/>
-              <a:sym typeface="Consolas"/>
-            </a:endParaRPr>
-          </a:p>
-          <a:p>
-            <a:pPr marL="0" indent="0">
-              <a:buNone/>
-              <a:defRPr sz="1800">
-                <a:solidFill>
-                  <a:srgbClr val="000000"/>
-                </a:solidFill>
-              </a:defRPr>
-            </a:pPr>
-            <a:r>
-              <a:rPr lang="en-US" sz="1100" dirty="0">
-                <a:solidFill>
-                  <a:srgbClr val="1BB2E2"/>
-                </a:solidFill>
-                <a:latin typeface="Courier" charset="0"/>
-                <a:ea typeface="Courier" charset="0"/>
-                <a:cs typeface="Courier" charset="0"/>
-                <a:sym typeface="Consolas"/>
-              </a:rPr>
-              <a:t>//opening a bucket in the cluster</a:t>
-            </a:r>
-          </a:p>
-          <a:p>
-            <a:pPr marL="0" indent="0">
-              <a:buNone/>
-              <a:defRPr sz="1800">
-                <a:solidFill>
-                  <a:srgbClr val="000000"/>
-                </a:solidFill>
-              </a:defRPr>
-            </a:pPr>
-            <a:r>
-              <a:rPr lang="en-US" sz="1100" dirty="0" err="1">
-                <a:solidFill>
-                  <a:srgbClr val="1E1C1C"/>
-                </a:solidFill>
-                <a:latin typeface="Courier" charset="0"/>
-                <a:ea typeface="Courier" charset="0"/>
-                <a:cs typeface="Courier" charset="0"/>
-                <a:sym typeface="Consolas"/>
-              </a:rPr>
-              <a:t>var</a:t>
-            </a:r>
-            <a:r>
-              <a:rPr lang="en-US" sz="1100" dirty="0">
-                <a:solidFill>
-                  <a:srgbClr val="1E1C1C"/>
-                </a:solidFill>
-                <a:latin typeface="Courier" charset="0"/>
-                <a:ea typeface="Courier" charset="0"/>
-                <a:cs typeface="Courier" charset="0"/>
-                <a:sym typeface="Consolas"/>
-              </a:rPr>
-              <a:t> </a:t>
-            </a:r>
-            <a:r>
-              <a:rPr lang="en-US" sz="1100" dirty="0" err="1">
-                <a:solidFill>
-                  <a:srgbClr val="1E1C1C"/>
-                </a:solidFill>
-                <a:latin typeface="Courier" charset="0"/>
-                <a:ea typeface="Courier" charset="0"/>
-                <a:cs typeface="Courier" charset="0"/>
-                <a:sym typeface="Consolas"/>
-              </a:rPr>
-              <a:t>myBucket</a:t>
-            </a:r>
-            <a:r>
-              <a:rPr lang="en-US" sz="1100" dirty="0">
-                <a:solidFill>
-                  <a:srgbClr val="1E1C1C"/>
-                </a:solidFill>
-                <a:latin typeface="Courier" charset="0"/>
-                <a:ea typeface="Courier" charset="0"/>
-                <a:cs typeface="Courier" charset="0"/>
-                <a:sym typeface="Consolas"/>
-              </a:rPr>
-              <a:t> = </a:t>
-            </a:r>
-            <a:r>
-              <a:rPr lang="en-US" sz="1100" dirty="0" err="1">
-                <a:solidFill>
-                  <a:srgbClr val="1E1C1C"/>
-                </a:solidFill>
-                <a:latin typeface="Courier" charset="0"/>
-                <a:ea typeface="Courier" charset="0"/>
-                <a:cs typeface="Courier" charset="0"/>
-                <a:sym typeface="Consolas"/>
-              </a:rPr>
-              <a:t>cluster.openBucket</a:t>
-            </a:r>
-            <a:r>
-              <a:rPr lang="en-US" sz="1100" dirty="0">
-                <a:solidFill>
-                  <a:srgbClr val="1E1C1C"/>
-                </a:solidFill>
-                <a:latin typeface="Courier" charset="0"/>
-                <a:ea typeface="Courier" charset="0"/>
-                <a:cs typeface="Courier" charset="0"/>
-                <a:sym typeface="Consolas"/>
-              </a:rPr>
-              <a:t>(</a:t>
-            </a:r>
-            <a:r>
-              <a:rPr lang="en-US" sz="1100" dirty="0">
-                <a:solidFill>
-                  <a:srgbClr val="E40121"/>
-                </a:solidFill>
-                <a:latin typeface="Courier" charset="0"/>
-                <a:ea typeface="Courier" charset="0"/>
-                <a:cs typeface="Courier" charset="0"/>
-                <a:sym typeface="Consolas"/>
-              </a:rPr>
-              <a:t>"travel-sample"</a:t>
-            </a:r>
-            <a:r>
-              <a:rPr lang="en-US" sz="1100" dirty="0">
-                <a:solidFill>
-                  <a:srgbClr val="1E1C1C"/>
-                </a:solidFill>
-                <a:latin typeface="Courier" charset="0"/>
-                <a:ea typeface="Courier" charset="0"/>
-                <a:cs typeface="Courier" charset="0"/>
-                <a:sym typeface="Consolas"/>
-              </a:rPr>
-              <a:t>, </a:t>
-            </a:r>
-            <a:r>
-              <a:rPr lang="en-US" sz="1100" dirty="0">
-                <a:solidFill>
-                  <a:srgbClr val="E40121"/>
-                </a:solidFill>
-                <a:latin typeface="Courier" charset="0"/>
-                <a:ea typeface="Courier" charset="0"/>
-                <a:cs typeface="Courier" charset="0"/>
-                <a:sym typeface="Consolas"/>
-              </a:rPr>
-              <a:t>“password"</a:t>
-            </a:r>
-            <a:r>
-              <a:rPr lang="en-US" sz="1100" dirty="0">
-                <a:solidFill>
-                  <a:srgbClr val="1E1C1C"/>
-                </a:solidFill>
-                <a:latin typeface="Courier" charset="0"/>
-                <a:ea typeface="Courier" charset="0"/>
-                <a:cs typeface="Courier" charset="0"/>
-                <a:sym typeface="Consolas"/>
-              </a:rPr>
-              <a:t>);</a:t>
-            </a:r>
-          </a:p>
-          <a:p>
-            <a:pPr marL="0" indent="0">
-              <a:buNone/>
-              <a:defRPr sz="1800">
-                <a:solidFill>
-                  <a:srgbClr val="000000"/>
-                </a:solidFill>
-              </a:defRPr>
-            </a:pPr>
-            <a:endParaRPr lang="en-US" sz="1100" dirty="0">
-              <a:solidFill>
-                <a:srgbClr val="1E1C1C"/>
-              </a:solidFill>
-              <a:latin typeface="Courier" charset="0"/>
-              <a:ea typeface="Courier" charset="0"/>
-              <a:cs typeface="Courier" charset="0"/>
-              <a:sym typeface="Consolas"/>
-            </a:endParaRPr>
-          </a:p>
-          <a:p>
-            <a:pPr marL="0" indent="0">
-              <a:buNone/>
-              <a:defRPr sz="1800">
-                <a:solidFill>
-                  <a:srgbClr val="000000"/>
-                </a:solidFill>
-              </a:defRPr>
-            </a:pPr>
-            <a:r>
-              <a:rPr lang="en-US" sz="1100" dirty="0">
-                <a:solidFill>
-                  <a:srgbClr val="1BB2E2"/>
-                </a:solidFill>
-                <a:latin typeface="Courier" charset="0"/>
-                <a:ea typeface="Courier" charset="0"/>
-                <a:cs typeface="Courier" charset="0"/>
-                <a:sym typeface="Consolas"/>
-              </a:rPr>
-              <a:t>//preparing N1ql</a:t>
-            </a:r>
-          </a:p>
-          <a:p>
-            <a:pPr marL="0" indent="0">
-              <a:buNone/>
-              <a:defRPr sz="1800">
-                <a:solidFill>
-                  <a:srgbClr val="000000"/>
-                </a:solidFill>
-              </a:defRPr>
-            </a:pPr>
-            <a:r>
-              <a:rPr lang="en-US" sz="1100" dirty="0" err="1">
-                <a:solidFill>
-                  <a:srgbClr val="2E2E2C"/>
-                </a:solidFill>
-                <a:latin typeface="Courier" charset="0"/>
-                <a:ea typeface="Courier" charset="0"/>
-                <a:cs typeface="Courier" charset="0"/>
-                <a:sym typeface="Consolas"/>
-              </a:rPr>
-              <a:t>var</a:t>
-            </a:r>
-            <a:r>
-              <a:rPr lang="en-US" sz="1100" dirty="0">
-                <a:solidFill>
-                  <a:srgbClr val="2E2E2C"/>
-                </a:solidFill>
-                <a:latin typeface="Courier" charset="0"/>
-                <a:ea typeface="Courier" charset="0"/>
-                <a:cs typeface="Courier" charset="0"/>
-                <a:sym typeface="Consolas"/>
-              </a:rPr>
-              <a:t> </a:t>
-            </a:r>
-            <a:r>
-              <a:rPr lang="en-US" sz="1100" dirty="0" err="1">
-                <a:solidFill>
-                  <a:srgbClr val="2E2E2C"/>
-                </a:solidFill>
-                <a:latin typeface="Courier" charset="0"/>
-                <a:ea typeface="Courier" charset="0"/>
-                <a:cs typeface="Courier" charset="0"/>
-                <a:sym typeface="Consolas"/>
-              </a:rPr>
-              <a:t>myQuery</a:t>
-            </a:r>
-            <a:r>
-              <a:rPr lang="en-US" sz="1100" dirty="0">
-                <a:solidFill>
-                  <a:srgbClr val="2E2E2C"/>
-                </a:solidFill>
-                <a:latin typeface="Courier" charset="0"/>
-                <a:ea typeface="Courier" charset="0"/>
-                <a:cs typeface="Courier" charset="0"/>
-                <a:sym typeface="Consolas"/>
-              </a:rPr>
-              <a:t> = Couchbase.N1qlQuery();</a:t>
-            </a:r>
-          </a:p>
-          <a:p>
-            <a:pPr marL="0" indent="0">
-              <a:buNone/>
-              <a:defRPr sz="1800">
-                <a:solidFill>
-                  <a:srgbClr val="000000"/>
-                </a:solidFill>
-              </a:defRPr>
-            </a:pPr>
-            <a:endParaRPr lang="en-US" sz="1100" dirty="0">
-              <a:solidFill>
-                <a:srgbClr val="1E1C1C"/>
-              </a:solidFill>
-              <a:latin typeface="Courier" charset="0"/>
-              <a:ea typeface="Courier" charset="0"/>
-              <a:cs typeface="Courier" charset="0"/>
-              <a:sym typeface="Consolas"/>
-            </a:endParaRPr>
-          </a:p>
-          <a:p>
-            <a:pPr marL="0" indent="0">
-              <a:buNone/>
-              <a:defRPr sz="1800">
-                <a:solidFill>
-                  <a:srgbClr val="000000"/>
-                </a:solidFill>
-              </a:defRPr>
-            </a:pPr>
-            <a:r>
-              <a:rPr lang="en-US" sz="1100" dirty="0">
-                <a:solidFill>
-                  <a:srgbClr val="1BB2E2"/>
-                </a:solidFill>
-                <a:latin typeface="Courier" charset="0"/>
-                <a:ea typeface="Courier" charset="0"/>
-                <a:cs typeface="Courier" charset="0"/>
-                <a:sym typeface="Consolas"/>
-              </a:rPr>
-              <a:t>//creating and saving a Document</a:t>
-            </a:r>
-          </a:p>
-          <a:p>
-            <a:pPr marL="0" indent="0">
-              <a:buNone/>
-              <a:defRPr sz="1800">
-                <a:solidFill>
-                  <a:srgbClr val="000000"/>
-                </a:solidFill>
-              </a:defRPr>
-            </a:pPr>
-            <a:r>
-              <a:rPr lang="en-US" sz="1100" dirty="0" err="1">
-                <a:solidFill>
-                  <a:srgbClr val="2E2E2C"/>
-                </a:solidFill>
-                <a:latin typeface="Courier" charset="0"/>
-                <a:ea typeface="Courier" charset="0"/>
-                <a:cs typeface="Courier" charset="0"/>
-                <a:sym typeface="Consolas"/>
-              </a:rPr>
-              <a:t>var</a:t>
-            </a:r>
-            <a:r>
-              <a:rPr lang="en-US" sz="1100" dirty="0">
-                <a:solidFill>
-                  <a:srgbClr val="2E2E2C"/>
-                </a:solidFill>
-                <a:latin typeface="Courier" charset="0"/>
-                <a:ea typeface="Courier" charset="0"/>
-                <a:cs typeface="Courier" charset="0"/>
-                <a:sym typeface="Consolas"/>
-              </a:rPr>
-              <a:t> document = { </a:t>
-            </a:r>
-            <a:r>
-              <a:rPr lang="en-US" sz="1100" dirty="0" err="1">
-                <a:solidFill>
-                  <a:srgbClr val="2E2E2C"/>
-                </a:solidFill>
-                <a:latin typeface="Courier" charset="0"/>
-                <a:ea typeface="Courier" charset="0"/>
-                <a:cs typeface="Courier" charset="0"/>
-                <a:sym typeface="Consolas"/>
-              </a:rPr>
-              <a:t>firstname</a:t>
-            </a:r>
-            <a:r>
-              <a:rPr lang="en-US" sz="1100" dirty="0">
-                <a:solidFill>
-                  <a:srgbClr val="2E2E2C"/>
-                </a:solidFill>
-                <a:latin typeface="Courier" charset="0"/>
-                <a:ea typeface="Courier" charset="0"/>
-                <a:cs typeface="Courier" charset="0"/>
-                <a:sym typeface="Consolas"/>
-              </a:rPr>
-              <a:t>: </a:t>
-            </a:r>
-            <a:r>
-              <a:rPr lang="en-US" sz="1100" dirty="0">
-                <a:solidFill>
-                  <a:srgbClr val="E40121"/>
-                </a:solidFill>
-                <a:latin typeface="Courier" charset="0"/>
-                <a:ea typeface="Courier" charset="0"/>
-                <a:cs typeface="Courier" charset="0"/>
-                <a:sym typeface="Consolas"/>
-              </a:rPr>
-              <a:t>“Matt"</a:t>
-            </a:r>
-            <a:r>
-              <a:rPr lang="en-US" sz="1100" dirty="0">
-                <a:solidFill>
-                  <a:srgbClr val="2E2E2C"/>
-                </a:solidFill>
-                <a:latin typeface="Courier" charset="0"/>
-                <a:ea typeface="Courier" charset="0"/>
-                <a:cs typeface="Courier" charset="0"/>
-                <a:sym typeface="Consolas"/>
-              </a:rPr>
-              <a:t>, </a:t>
-            </a:r>
-            <a:r>
-              <a:rPr lang="en-US" sz="1100" dirty="0" err="1">
-                <a:solidFill>
-                  <a:srgbClr val="2E2E2C"/>
-                </a:solidFill>
-                <a:latin typeface="Courier" charset="0"/>
-                <a:ea typeface="Courier" charset="0"/>
-                <a:cs typeface="Courier" charset="0"/>
-                <a:sym typeface="Consolas"/>
-              </a:rPr>
-              <a:t>lastname</a:t>
-            </a:r>
-            <a:r>
-              <a:rPr lang="en-US" sz="1100" dirty="0">
-                <a:solidFill>
-                  <a:srgbClr val="2E2E2C"/>
-                </a:solidFill>
-                <a:latin typeface="Courier" charset="0"/>
-                <a:ea typeface="Courier" charset="0"/>
-                <a:cs typeface="Courier" charset="0"/>
-                <a:sym typeface="Consolas"/>
-              </a:rPr>
-              <a:t>: </a:t>
-            </a:r>
-            <a:r>
-              <a:rPr lang="en-US" sz="1100" dirty="0">
-                <a:solidFill>
-                  <a:srgbClr val="E40121"/>
-                </a:solidFill>
-                <a:latin typeface="Courier" charset="0"/>
-                <a:ea typeface="Courier" charset="0"/>
-                <a:cs typeface="Courier" charset="0"/>
-                <a:sym typeface="Consolas"/>
-              </a:rPr>
-              <a:t>“Groves“ </a:t>
-            </a:r>
-            <a:r>
-              <a:rPr lang="en-US" sz="1100" dirty="0">
-                <a:solidFill>
-                  <a:srgbClr val="2E2E2C"/>
-                </a:solidFill>
-                <a:latin typeface="Courier" charset="0"/>
-                <a:ea typeface="Courier" charset="0"/>
-                <a:cs typeface="Courier" charset="0"/>
-                <a:sym typeface="Consolas"/>
-              </a:rPr>
-              <a:t>};</a:t>
-            </a:r>
-          </a:p>
-          <a:p>
-            <a:pPr marL="0" indent="0">
-              <a:buNone/>
-              <a:defRPr sz="1800">
-                <a:solidFill>
-                  <a:srgbClr val="000000"/>
-                </a:solidFill>
-              </a:defRPr>
-            </a:pPr>
-            <a:r>
-              <a:rPr lang="en-US" sz="1100" dirty="0" err="1">
-                <a:solidFill>
-                  <a:srgbClr val="2E2E2C"/>
-                </a:solidFill>
-                <a:latin typeface="Courier" charset="0"/>
-                <a:ea typeface="Courier" charset="0"/>
-                <a:cs typeface="Courier" charset="0"/>
-                <a:sym typeface="Consolas"/>
-              </a:rPr>
-              <a:t>myBucket.insert</a:t>
-            </a:r>
-            <a:r>
-              <a:rPr lang="en-US" sz="1100" dirty="0">
-                <a:solidFill>
-                  <a:srgbClr val="2E2E2C"/>
-                </a:solidFill>
-                <a:latin typeface="Courier" charset="0"/>
-                <a:ea typeface="Courier" charset="0"/>
-                <a:cs typeface="Courier" charset="0"/>
-                <a:sym typeface="Consolas"/>
-              </a:rPr>
-              <a:t>(</a:t>
-            </a:r>
-            <a:r>
-              <a:rPr lang="en-US" sz="1100" dirty="0">
-                <a:solidFill>
-                  <a:srgbClr val="E40121"/>
-                </a:solidFill>
-                <a:latin typeface="Courier" charset="0"/>
-                <a:ea typeface="Courier" charset="0"/>
-                <a:cs typeface="Courier" charset="0"/>
-                <a:sym typeface="Consolas"/>
-              </a:rPr>
-              <a:t>"my-key"</a:t>
-            </a:r>
-            <a:r>
-              <a:rPr lang="en-US" sz="1100" dirty="0">
-                <a:solidFill>
-                  <a:srgbClr val="2E2E2C"/>
-                </a:solidFill>
-                <a:latin typeface="Courier" charset="0"/>
-                <a:ea typeface="Courier" charset="0"/>
-                <a:cs typeface="Courier" charset="0"/>
-                <a:sym typeface="Consolas"/>
-              </a:rPr>
-              <a:t>, document, function(error, result) {});</a:t>
-            </a:r>
-          </a:p>
-        </p:txBody>
-      </p:sp>
-    </p:spTree>
-    <p:extLst>
-      <p:ext uri="{BB962C8B-B14F-4D97-AF65-F5344CB8AC3E}">
-        <p14:creationId xmlns:p14="http://schemas.microsoft.com/office/powerpoint/2010/main" val="181234665"/>
-      </p:ext>
-    </p:extLst>
-  </p:cSld>
-  <p:clrMapOvr>
-    <a:masterClrMapping/>
-  </p:clrMapOvr>
-</p:sld>
-</file>
-
-<file path=ppt/slides/slide15.xml><?xml version="1.0" encoding="utf-8"?>
-<p:sld xmlns:a="http://schemas.openxmlformats.org/drawingml/2006/main" xmlns:r="http://schemas.openxmlformats.org/officeDocument/2006/relationships" xmlns:p="http://schemas.openxmlformats.org/presentationml/2006/main">
-  <p:cSld>
-    <p:spTree>
-      <p:nvGrpSpPr>
-        <p:cNvPr id="1" name=""/>
-        <p:cNvGrpSpPr/>
-        <p:nvPr/>
-      </p:nvGrpSpPr>
-      <p:grpSpPr>
-        <a:xfrm>
-          <a:off x="0" y="0"/>
-          <a:ext cx="0" cy="0"/>
-          <a:chOff x="0" y="0"/>
-          <a:chExt cx="0" cy="0"/>
-        </a:xfrm>
-      </p:grpSpPr>
-      <p:sp>
-        <p:nvSpPr>
-          <p:cNvPr id="2" name="Title 1"/>
-          <p:cNvSpPr>
-            <a:spLocks noGrp="1"/>
-          </p:cNvSpPr>
-          <p:nvPr>
-            <p:ph type="title"/>
-          </p:nvPr>
-        </p:nvSpPr>
-        <p:spPr/>
-        <p:txBody>
-          <a:bodyPr/>
-          <a:lstStyle/>
-          <a:p>
-            <a:r>
-              <a:rPr lang="en-US" dirty="0"/>
-              <a:t>SDK: Java</a:t>
-            </a:r>
-          </a:p>
-        </p:txBody>
-      </p:sp>
-      <p:sp>
-        <p:nvSpPr>
-          <p:cNvPr id="3" name="Content Placeholder 2"/>
-          <p:cNvSpPr txBox="1">
-            <a:spLocks/>
-          </p:cNvSpPr>
-          <p:nvPr/>
-        </p:nvSpPr>
-        <p:spPr>
-          <a:xfrm>
-            <a:off x="609600" y="704850"/>
-            <a:ext cx="8007739" cy="3394472"/>
-          </a:xfrm>
-          <a:prstGeom prst="rect">
-            <a:avLst/>
-          </a:prstGeom>
-        </p:spPr>
-        <p:txBody>
-          <a:bodyPr/>
-          <a:lstStyle>
-            <a:lvl1pPr marL="228600" indent="-228600" algn="l" defTabSz="457200" rtl="0" eaLnBrk="1" latinLnBrk="0" hangingPunct="1">
-              <a:spcBef>
-                <a:spcPts val="0"/>
-              </a:spcBef>
-              <a:buClr>
-                <a:schemeClr val="accent1"/>
-              </a:buClr>
-              <a:buFont typeface="Wingdings" charset="2"/>
-              <a:buChar char="§"/>
-              <a:defRPr sz="2400" kern="1200">
-                <a:solidFill>
-                  <a:schemeClr val="tx1"/>
-                </a:solidFill>
-                <a:latin typeface="+mn-lt"/>
-                <a:ea typeface="+mn-ea"/>
-                <a:cs typeface="+mn-cs"/>
-              </a:defRPr>
-            </a:lvl1pPr>
-            <a:lvl2pPr marL="455613" indent="-227013" algn="l" defTabSz="457200" rtl="0" eaLnBrk="1" latinLnBrk="0" hangingPunct="1">
-              <a:spcBef>
-                <a:spcPts val="0"/>
-              </a:spcBef>
-              <a:buClr>
-                <a:srgbClr val="262626"/>
-              </a:buClr>
-              <a:buFont typeface="Wingdings" charset="2"/>
-              <a:buChar char="§"/>
-              <a:defRPr sz="2000" kern="1200">
-                <a:solidFill>
-                  <a:schemeClr val="tx1"/>
-                </a:solidFill>
-                <a:latin typeface="+mn-lt"/>
-                <a:ea typeface="+mn-ea"/>
-                <a:cs typeface="+mn-cs"/>
-              </a:defRPr>
-            </a:lvl2pPr>
-            <a:lvl3pPr marL="455613" indent="-228600" algn="l" defTabSz="457200" rtl="0" eaLnBrk="1" latinLnBrk="0" hangingPunct="1">
-              <a:spcBef>
-                <a:spcPts val="0"/>
-              </a:spcBef>
-              <a:buClr>
-                <a:srgbClr val="262626"/>
-              </a:buClr>
-              <a:buFont typeface="Wingdings" charset="2"/>
-              <a:buChar char="§"/>
-              <a:defRPr sz="2000" kern="1200">
-                <a:solidFill>
-                  <a:schemeClr val="tx1"/>
-                </a:solidFill>
-                <a:latin typeface="+mn-lt"/>
-                <a:ea typeface="+mn-ea"/>
-                <a:cs typeface="+mn-cs"/>
-              </a:defRPr>
-            </a:lvl3pPr>
-            <a:lvl4pPr marL="455613" indent="-228600" algn="l" defTabSz="457200" rtl="0" eaLnBrk="1" latinLnBrk="0" hangingPunct="1">
-              <a:spcBef>
-                <a:spcPts val="0"/>
-              </a:spcBef>
-              <a:buClr>
-                <a:srgbClr val="262626"/>
-              </a:buClr>
-              <a:buFont typeface="Wingdings" charset="2"/>
-              <a:buChar char="§"/>
-              <a:defRPr sz="2000" kern="1200">
-                <a:solidFill>
-                  <a:schemeClr val="tx1"/>
-                </a:solidFill>
-                <a:latin typeface="+mn-lt"/>
-                <a:ea typeface="+mn-ea"/>
-                <a:cs typeface="+mn-cs"/>
-              </a:defRPr>
-            </a:lvl4pPr>
-            <a:lvl5pPr marL="455613" indent="-228600" algn="l" defTabSz="457200" rtl="0" eaLnBrk="1" latinLnBrk="0" hangingPunct="1">
-              <a:spcBef>
-                <a:spcPts val="200"/>
-              </a:spcBef>
-              <a:buClr>
-                <a:srgbClr val="262626"/>
-              </a:buClr>
-              <a:buFont typeface="Wingdings" charset="2"/>
-              <a:buChar char="§"/>
-              <a:defRPr sz="2000" kern="1200">
-                <a:solidFill>
-                  <a:schemeClr val="tx1"/>
-                </a:solidFill>
-                <a:latin typeface="+mn-lt"/>
-                <a:ea typeface="+mn-ea"/>
-                <a:cs typeface="+mn-cs"/>
-              </a:defRPr>
-            </a:lvl5pPr>
-            <a:lvl6pPr marL="2514600" indent="-228600" algn="l" defTabSz="457200" rtl="0" eaLnBrk="1" latinLnBrk="0" hangingPunct="1">
-              <a:spcBef>
-                <a:spcPct val="20000"/>
-              </a:spcBef>
-              <a:buFont typeface="Arial"/>
-              <a:buChar char="•"/>
-              <a:defRPr sz="2000" kern="1200">
-                <a:solidFill>
-                  <a:schemeClr val="tx1"/>
-                </a:solidFill>
-                <a:latin typeface="+mn-lt"/>
-                <a:ea typeface="+mn-ea"/>
-                <a:cs typeface="+mn-cs"/>
-              </a:defRPr>
-            </a:lvl6pPr>
-            <a:lvl7pPr marL="2971800" indent="-228600" algn="l" defTabSz="457200" rtl="0" eaLnBrk="1" latinLnBrk="0" hangingPunct="1">
-              <a:spcBef>
-                <a:spcPct val="20000"/>
-              </a:spcBef>
-              <a:buFont typeface="Arial"/>
-              <a:buChar char="•"/>
-              <a:defRPr sz="2000" kern="1200">
-                <a:solidFill>
-                  <a:schemeClr val="tx1"/>
-                </a:solidFill>
-                <a:latin typeface="+mn-lt"/>
-                <a:ea typeface="+mn-ea"/>
-                <a:cs typeface="+mn-cs"/>
-              </a:defRPr>
-            </a:lvl7pPr>
-            <a:lvl8pPr marL="3429000" indent="-228600" algn="l" defTabSz="457200" rtl="0" eaLnBrk="1" latinLnBrk="0" hangingPunct="1">
-              <a:spcBef>
-                <a:spcPct val="20000"/>
-              </a:spcBef>
-              <a:buFont typeface="Arial"/>
-              <a:buChar char="•"/>
-              <a:defRPr sz="2000" kern="1200">
-                <a:solidFill>
-                  <a:schemeClr val="tx1"/>
-                </a:solidFill>
-                <a:latin typeface="+mn-lt"/>
-                <a:ea typeface="+mn-ea"/>
-                <a:cs typeface="+mn-cs"/>
-              </a:defRPr>
-            </a:lvl8pPr>
-            <a:lvl9pPr marL="3886200" indent="-228600" algn="l" defTabSz="457200" rtl="0" eaLnBrk="1" latinLnBrk="0" hangingPunct="1">
-              <a:spcBef>
-                <a:spcPct val="20000"/>
-              </a:spcBef>
-              <a:buFont typeface="Arial"/>
-              <a:buChar char="•"/>
-              <a:defRPr sz="2000" kern="1200">
-                <a:solidFill>
-                  <a:schemeClr val="tx1"/>
-                </a:solidFill>
-                <a:latin typeface="+mn-lt"/>
-                <a:ea typeface="+mn-ea"/>
-                <a:cs typeface="+mn-cs"/>
-              </a:defRPr>
-            </a:lvl9pPr>
-          </a:lstStyle>
-          <a:p>
-            <a:pPr marL="342900" indent="-342900">
-              <a:buFont typeface="Arial" charset="0"/>
-              <a:buChar char="•"/>
-            </a:pPr>
-            <a:r>
-              <a:rPr lang="en-US" dirty="0"/>
-              <a:t>How to install</a:t>
-            </a:r>
-          </a:p>
-          <a:p>
-            <a:pPr marL="342900" indent="-342900">
-              <a:buFont typeface="Arial" charset="0"/>
-              <a:buChar char="•"/>
-            </a:pPr>
-            <a:endParaRPr lang="en-US" dirty="0"/>
-          </a:p>
-          <a:p>
-            <a:pPr marL="569913" lvl="1" indent="-342900">
-              <a:buFont typeface="Arial" charset="0"/>
-              <a:buChar char="•"/>
-            </a:pPr>
-            <a:r>
-              <a:rPr lang="en-US" dirty="0"/>
-              <a:t>Edit the pom.xml file</a:t>
-            </a:r>
-          </a:p>
-          <a:p>
-            <a:pPr marL="569913" lvl="1" indent="-342900">
-              <a:buFont typeface="Arial" charset="0"/>
-              <a:buChar char="•"/>
-            </a:pPr>
-            <a:endParaRPr lang="en-US" dirty="0"/>
-          </a:p>
-          <a:p>
-            <a:pPr marL="342900" indent="-342900">
-              <a:buFont typeface="Arial" charset="0"/>
-              <a:buChar char="•"/>
-            </a:pPr>
-            <a:r>
-              <a:rPr lang="en-US" dirty="0"/>
-              <a:t>How to connect to a </a:t>
-            </a:r>
-            <a:r>
-              <a:rPr lang="en-US" dirty="0" err="1"/>
-              <a:t>Couchbase</a:t>
-            </a:r>
-            <a:r>
-              <a:rPr lang="en-US" dirty="0"/>
-              <a:t> cluster</a:t>
-            </a:r>
-          </a:p>
-          <a:p>
-            <a:pPr marL="342900" indent="-342900">
-              <a:buFont typeface="Arial" charset="0"/>
-              <a:buChar char="•"/>
-            </a:pPr>
-            <a:endParaRPr lang="en-US" dirty="0"/>
-          </a:p>
-          <a:p>
-            <a:pPr marL="342900" indent="-342900">
-              <a:buFont typeface="Arial" charset="0"/>
-              <a:buChar char="•"/>
-            </a:pPr>
-            <a:endParaRPr lang="en-US" dirty="0"/>
-          </a:p>
-          <a:p>
-            <a:endParaRPr lang="en-US" dirty="0"/>
-          </a:p>
-        </p:txBody>
-      </p:sp>
-      <p:sp>
-        <p:nvSpPr>
-          <p:cNvPr id="4" name="Shape 1658"/>
-          <p:cNvSpPr txBox="1">
-            <a:spLocks/>
-          </p:cNvSpPr>
-          <p:nvPr/>
-        </p:nvSpPr>
-        <p:spPr>
-          <a:xfrm>
-            <a:off x="1288661" y="1812120"/>
-            <a:ext cx="6236089" cy="2855130"/>
-          </a:xfrm>
-          <a:prstGeom prst="rect">
-            <a:avLst/>
-          </a:prstGeom>
-        </p:spPr>
-        <p:txBody>
-          <a:bodyPr lIns="0" tIns="0" rIns="0" bIns="0">
-            <a:noAutofit/>
-          </a:bodyPr>
-          <a:lstStyle>
-            <a:lvl1pPr marL="228600" indent="-228600" algn="l" defTabSz="457200" rtl="0" eaLnBrk="1" latinLnBrk="0" hangingPunct="1">
-              <a:spcBef>
-                <a:spcPts val="0"/>
-              </a:spcBef>
-              <a:buClr>
-                <a:schemeClr val="accent1"/>
-              </a:buClr>
-              <a:buFont typeface="Wingdings" charset="2"/>
-              <a:buChar char="§"/>
-              <a:defRPr sz="2400" kern="1200">
-                <a:solidFill>
-                  <a:schemeClr val="tx1"/>
-                </a:solidFill>
-                <a:latin typeface="+mn-lt"/>
-                <a:ea typeface="+mn-ea"/>
-                <a:cs typeface="+mn-cs"/>
-              </a:defRPr>
-            </a:lvl1pPr>
-            <a:lvl2pPr marL="455613" indent="-227013" algn="l" defTabSz="457200" rtl="0" eaLnBrk="1" latinLnBrk="0" hangingPunct="1">
-              <a:spcBef>
-                <a:spcPts val="0"/>
-              </a:spcBef>
-              <a:buClr>
-                <a:srgbClr val="262626"/>
-              </a:buClr>
-              <a:buFont typeface="Wingdings" charset="2"/>
-              <a:buChar char="§"/>
-              <a:defRPr sz="2000" kern="1200">
-                <a:solidFill>
-                  <a:schemeClr val="tx1"/>
-                </a:solidFill>
-                <a:latin typeface="+mn-lt"/>
-                <a:ea typeface="+mn-ea"/>
-                <a:cs typeface="+mn-cs"/>
-              </a:defRPr>
-            </a:lvl2pPr>
-            <a:lvl3pPr marL="455613" indent="-228600" algn="l" defTabSz="457200" rtl="0" eaLnBrk="1" latinLnBrk="0" hangingPunct="1">
-              <a:spcBef>
-                <a:spcPts val="0"/>
-              </a:spcBef>
-              <a:buClr>
-                <a:srgbClr val="262626"/>
-              </a:buClr>
-              <a:buFont typeface="Wingdings" charset="2"/>
-              <a:buChar char="§"/>
-              <a:defRPr sz="2000" kern="1200">
-                <a:solidFill>
-                  <a:schemeClr val="tx1"/>
-                </a:solidFill>
-                <a:latin typeface="+mn-lt"/>
-                <a:ea typeface="+mn-ea"/>
-                <a:cs typeface="+mn-cs"/>
-              </a:defRPr>
-            </a:lvl3pPr>
-            <a:lvl4pPr marL="455613" indent="-228600" algn="l" defTabSz="457200" rtl="0" eaLnBrk="1" latinLnBrk="0" hangingPunct="1">
-              <a:spcBef>
-                <a:spcPts val="0"/>
-              </a:spcBef>
-              <a:buClr>
-                <a:srgbClr val="262626"/>
-              </a:buClr>
-              <a:buFont typeface="Wingdings" charset="2"/>
-              <a:buChar char="§"/>
-              <a:defRPr sz="2000" kern="1200">
-                <a:solidFill>
-                  <a:schemeClr val="tx1"/>
-                </a:solidFill>
-                <a:latin typeface="+mn-lt"/>
-                <a:ea typeface="+mn-ea"/>
-                <a:cs typeface="+mn-cs"/>
-              </a:defRPr>
-            </a:lvl4pPr>
-            <a:lvl5pPr marL="455613" indent="-228600" algn="l" defTabSz="457200" rtl="0" eaLnBrk="1" latinLnBrk="0" hangingPunct="1">
-              <a:spcBef>
-                <a:spcPts val="200"/>
-              </a:spcBef>
-              <a:buClr>
-                <a:srgbClr val="262626"/>
-              </a:buClr>
-              <a:buFont typeface="Wingdings" charset="2"/>
-              <a:buChar char="§"/>
-              <a:defRPr sz="2000" kern="1200">
-                <a:solidFill>
-                  <a:schemeClr val="tx1"/>
-                </a:solidFill>
-                <a:latin typeface="+mn-lt"/>
-                <a:ea typeface="+mn-ea"/>
-                <a:cs typeface="+mn-cs"/>
-              </a:defRPr>
-            </a:lvl5pPr>
-            <a:lvl6pPr marL="2514600" indent="-228600" algn="l" defTabSz="457200" rtl="0" eaLnBrk="1" latinLnBrk="0" hangingPunct="1">
-              <a:spcBef>
-                <a:spcPct val="20000"/>
-              </a:spcBef>
-              <a:buFont typeface="Arial"/>
-              <a:buChar char="•"/>
-              <a:defRPr sz="2000" kern="1200">
-                <a:solidFill>
-                  <a:schemeClr val="tx1"/>
-                </a:solidFill>
-                <a:latin typeface="+mn-lt"/>
-                <a:ea typeface="+mn-ea"/>
-                <a:cs typeface="+mn-cs"/>
-              </a:defRPr>
-            </a:lvl6pPr>
-            <a:lvl7pPr marL="2971800" indent="-228600" algn="l" defTabSz="457200" rtl="0" eaLnBrk="1" latinLnBrk="0" hangingPunct="1">
-              <a:spcBef>
-                <a:spcPct val="20000"/>
-              </a:spcBef>
-              <a:buFont typeface="Arial"/>
-              <a:buChar char="•"/>
-              <a:defRPr sz="2000" kern="1200">
-                <a:solidFill>
-                  <a:schemeClr val="tx1"/>
-                </a:solidFill>
-                <a:latin typeface="+mn-lt"/>
-                <a:ea typeface="+mn-ea"/>
-                <a:cs typeface="+mn-cs"/>
-              </a:defRPr>
-            </a:lvl7pPr>
-            <a:lvl8pPr marL="3429000" indent="-228600" algn="l" defTabSz="457200" rtl="0" eaLnBrk="1" latinLnBrk="0" hangingPunct="1">
-              <a:spcBef>
-                <a:spcPct val="20000"/>
-              </a:spcBef>
-              <a:buFont typeface="Arial"/>
-              <a:buChar char="•"/>
-              <a:defRPr sz="2000" kern="1200">
-                <a:solidFill>
-                  <a:schemeClr val="tx1"/>
-                </a:solidFill>
-                <a:latin typeface="+mn-lt"/>
-                <a:ea typeface="+mn-ea"/>
-                <a:cs typeface="+mn-cs"/>
-              </a:defRPr>
-            </a:lvl8pPr>
-            <a:lvl9pPr marL="3886200" indent="-228600" algn="l" defTabSz="457200" rtl="0" eaLnBrk="1" latinLnBrk="0" hangingPunct="1">
-              <a:spcBef>
-                <a:spcPct val="20000"/>
-              </a:spcBef>
-              <a:buFont typeface="Arial"/>
-              <a:buChar char="•"/>
-              <a:defRPr sz="2000" kern="1200">
-                <a:solidFill>
-                  <a:schemeClr val="tx1"/>
-                </a:solidFill>
-                <a:latin typeface="+mn-lt"/>
-                <a:ea typeface="+mn-ea"/>
-                <a:cs typeface="+mn-cs"/>
-              </a:defRPr>
-            </a:lvl9pPr>
-          </a:lstStyle>
-          <a:p>
-            <a:pPr marL="0" indent="0">
-              <a:buNone/>
-              <a:defRPr sz="1800">
-                <a:solidFill>
-                  <a:srgbClr val="000000"/>
-                </a:solidFill>
-              </a:defRPr>
-            </a:pPr>
-            <a:endParaRPr lang="en-US" sz="1100" dirty="0">
-              <a:solidFill>
-                <a:srgbClr val="2E2E2C"/>
-              </a:solidFill>
-              <a:latin typeface="Courier" charset="0"/>
-              <a:ea typeface="Courier" charset="0"/>
-              <a:cs typeface="Courier" charset="0"/>
-              <a:sym typeface="Consolas"/>
-            </a:endParaRPr>
-          </a:p>
-        </p:txBody>
-      </p:sp>
-      <p:sp>
-        <p:nvSpPr>
-          <p:cNvPr id="6" name="Rectangle 5"/>
-          <p:cNvSpPr/>
-          <p:nvPr/>
-        </p:nvSpPr>
-        <p:spPr>
-          <a:xfrm>
-            <a:off x="1638883" y="2403872"/>
-            <a:ext cx="6432161" cy="2354491"/>
-          </a:xfrm>
-          <a:prstGeom prst="rect">
-            <a:avLst/>
-          </a:prstGeom>
-        </p:spPr>
-        <p:txBody>
-          <a:bodyPr wrap="square">
-            <a:spAutoFit/>
-          </a:bodyPr>
-          <a:lstStyle/>
-          <a:p>
-            <a:r>
-              <a:rPr lang="en-US" sz="1050" dirty="0">
-                <a:solidFill>
-                  <a:srgbClr val="008000"/>
-                </a:solidFill>
-                <a:highlight>
-                  <a:srgbClr val="FFFFFF"/>
-                </a:highlight>
-                <a:latin typeface="Consolas" panose="020B0609020204030204" pitchFamily="49" charset="0"/>
-              </a:rPr>
-              <a:t>// connecting to a cluster</a:t>
-            </a:r>
-          </a:p>
-          <a:p>
-            <a:r>
-              <a:rPr lang="en-US" sz="1050" dirty="0">
-                <a:solidFill>
-                  <a:srgbClr val="000000"/>
-                </a:solidFill>
-                <a:highlight>
-                  <a:srgbClr val="FFFFFF"/>
-                </a:highlight>
-                <a:latin typeface="Consolas" panose="020B0609020204030204" pitchFamily="49" charset="0"/>
-              </a:rPr>
-              <a:t>Cluster </a:t>
-            </a:r>
-            <a:r>
-              <a:rPr lang="en-US" sz="1050" dirty="0" err="1">
-                <a:solidFill>
-                  <a:srgbClr val="000000"/>
-                </a:solidFill>
-                <a:highlight>
-                  <a:srgbClr val="FFFFFF"/>
-                </a:highlight>
-                <a:latin typeface="Consolas" panose="020B0609020204030204" pitchFamily="49" charset="0"/>
-              </a:rPr>
-              <a:t>cluster</a:t>
-            </a:r>
-            <a:r>
-              <a:rPr lang="en-US" sz="1050" dirty="0">
-                <a:solidFill>
-                  <a:srgbClr val="000000"/>
-                </a:solidFill>
-                <a:highlight>
-                  <a:srgbClr val="FFFFFF"/>
-                </a:highlight>
-                <a:latin typeface="Consolas" panose="020B0609020204030204" pitchFamily="49" charset="0"/>
-              </a:rPr>
-              <a:t> </a:t>
-            </a:r>
-            <a:r>
-              <a:rPr lang="en-US" sz="1050" b="1" dirty="0">
-                <a:solidFill>
-                  <a:srgbClr val="000080"/>
-                </a:solidFill>
-                <a:highlight>
-                  <a:srgbClr val="FFFFFF"/>
-                </a:highlight>
-                <a:latin typeface="Consolas" panose="020B0609020204030204" pitchFamily="49" charset="0"/>
-              </a:rPr>
-              <a:t>=</a:t>
-            </a:r>
-            <a:r>
-              <a:rPr lang="en-US" sz="1050" dirty="0">
-                <a:solidFill>
-                  <a:srgbClr val="000000"/>
-                </a:solidFill>
-                <a:highlight>
-                  <a:srgbClr val="FFFFFF"/>
-                </a:highlight>
-                <a:latin typeface="Consolas" panose="020B0609020204030204" pitchFamily="49" charset="0"/>
-              </a:rPr>
-              <a:t> </a:t>
-            </a:r>
-            <a:r>
-              <a:rPr lang="en-US" sz="1050" dirty="0" err="1">
-                <a:solidFill>
-                  <a:srgbClr val="000000"/>
-                </a:solidFill>
-                <a:highlight>
-                  <a:srgbClr val="FFFFFF"/>
-                </a:highlight>
-                <a:latin typeface="Consolas" panose="020B0609020204030204" pitchFamily="49" charset="0"/>
-              </a:rPr>
-              <a:t>CouchbaseCluster</a:t>
-            </a:r>
-            <a:r>
-              <a:rPr lang="en-US" sz="1050" b="1" dirty="0" err="1">
-                <a:solidFill>
-                  <a:srgbClr val="000080"/>
-                </a:solidFill>
-                <a:highlight>
-                  <a:srgbClr val="FFFFFF"/>
-                </a:highlight>
-                <a:latin typeface="Consolas" panose="020B0609020204030204" pitchFamily="49" charset="0"/>
-              </a:rPr>
-              <a:t>.</a:t>
-            </a:r>
-            <a:r>
-              <a:rPr lang="en-US" sz="1050" dirty="0" err="1">
-                <a:solidFill>
-                  <a:srgbClr val="000000"/>
-                </a:solidFill>
-                <a:highlight>
-                  <a:srgbClr val="FFFFFF"/>
-                </a:highlight>
-                <a:latin typeface="Consolas" panose="020B0609020204030204" pitchFamily="49" charset="0"/>
-              </a:rPr>
-              <a:t>create</a:t>
-            </a:r>
-            <a:r>
-              <a:rPr lang="en-US" sz="1050" b="1" dirty="0">
-                <a:solidFill>
-                  <a:srgbClr val="000080"/>
-                </a:solidFill>
-                <a:highlight>
-                  <a:srgbClr val="FFFFFF"/>
-                </a:highlight>
-                <a:latin typeface="Consolas" panose="020B0609020204030204" pitchFamily="49" charset="0"/>
-              </a:rPr>
-              <a:t>(</a:t>
-            </a:r>
-            <a:r>
-              <a:rPr lang="en-US" sz="1050" dirty="0">
-                <a:solidFill>
-                  <a:srgbClr val="808080"/>
-                </a:solidFill>
-                <a:highlight>
-                  <a:srgbClr val="FFFFFF"/>
-                </a:highlight>
-                <a:latin typeface="Consolas" panose="020B0609020204030204" pitchFamily="49" charset="0"/>
-              </a:rPr>
-              <a:t>"localhost"</a:t>
-            </a:r>
-            <a:r>
-              <a:rPr lang="en-US" sz="1050" b="1" dirty="0">
-                <a:solidFill>
-                  <a:srgbClr val="000080"/>
-                </a:solidFill>
-                <a:highlight>
-                  <a:srgbClr val="FFFFFF"/>
-                </a:highlight>
-                <a:latin typeface="Consolas" panose="020B0609020204030204" pitchFamily="49" charset="0"/>
-              </a:rPr>
-              <a:t>);</a:t>
-            </a:r>
-            <a:endParaRPr lang="en-US" sz="1050" dirty="0">
-              <a:solidFill>
-                <a:srgbClr val="000000"/>
-              </a:solidFill>
-              <a:highlight>
-                <a:srgbClr val="FFFFFF"/>
-              </a:highlight>
-              <a:latin typeface="Consolas" panose="020B0609020204030204" pitchFamily="49" charset="0"/>
-            </a:endParaRPr>
-          </a:p>
-          <a:p>
-            <a:endParaRPr lang="en-US" sz="1050" dirty="0">
-              <a:solidFill>
-                <a:srgbClr val="000000"/>
-              </a:solidFill>
-              <a:highlight>
-                <a:srgbClr val="FFFFFF"/>
-              </a:highlight>
-              <a:latin typeface="Consolas" panose="020B0609020204030204" pitchFamily="49" charset="0"/>
-            </a:endParaRPr>
-          </a:p>
-          <a:p>
-            <a:r>
-              <a:rPr lang="en-US" sz="1050" dirty="0">
-                <a:solidFill>
-                  <a:srgbClr val="008000"/>
-                </a:solidFill>
-                <a:highlight>
-                  <a:srgbClr val="FFFFFF"/>
-                </a:highlight>
-                <a:latin typeface="Consolas" panose="020B0609020204030204" pitchFamily="49" charset="0"/>
-              </a:rPr>
-              <a:t>// opening a bucket in the cluster</a:t>
-            </a:r>
-          </a:p>
-          <a:p>
-            <a:r>
-              <a:rPr lang="en-US" sz="1050" dirty="0">
-                <a:solidFill>
-                  <a:srgbClr val="000000"/>
-                </a:solidFill>
-                <a:highlight>
-                  <a:srgbClr val="FFFFFF"/>
-                </a:highlight>
-                <a:latin typeface="Consolas" panose="020B0609020204030204" pitchFamily="49" charset="0"/>
-              </a:rPr>
-              <a:t>Bucket </a:t>
-            </a:r>
-            <a:r>
-              <a:rPr lang="en-US" sz="1050" dirty="0" err="1">
-                <a:solidFill>
-                  <a:srgbClr val="000000"/>
-                </a:solidFill>
-                <a:highlight>
-                  <a:srgbClr val="FFFFFF"/>
-                </a:highlight>
-                <a:latin typeface="Consolas" panose="020B0609020204030204" pitchFamily="49" charset="0"/>
-              </a:rPr>
-              <a:t>bucket</a:t>
-            </a:r>
-            <a:r>
-              <a:rPr lang="en-US" sz="1050" dirty="0">
-                <a:solidFill>
-                  <a:srgbClr val="000000"/>
-                </a:solidFill>
-                <a:highlight>
-                  <a:srgbClr val="FFFFFF"/>
-                </a:highlight>
-                <a:latin typeface="Consolas" panose="020B0609020204030204" pitchFamily="49" charset="0"/>
-              </a:rPr>
-              <a:t> </a:t>
-            </a:r>
-            <a:r>
-              <a:rPr lang="en-US" sz="1050" b="1" dirty="0">
-                <a:solidFill>
-                  <a:srgbClr val="000080"/>
-                </a:solidFill>
-                <a:highlight>
-                  <a:srgbClr val="FFFFFF"/>
-                </a:highlight>
-                <a:latin typeface="Consolas" panose="020B0609020204030204" pitchFamily="49" charset="0"/>
-              </a:rPr>
-              <a:t>=</a:t>
-            </a:r>
-            <a:r>
-              <a:rPr lang="en-US" sz="1050" dirty="0">
-                <a:solidFill>
-                  <a:srgbClr val="000000"/>
-                </a:solidFill>
-                <a:highlight>
-                  <a:srgbClr val="FFFFFF"/>
-                </a:highlight>
-                <a:latin typeface="Consolas" panose="020B0609020204030204" pitchFamily="49" charset="0"/>
-              </a:rPr>
-              <a:t> </a:t>
-            </a:r>
-            <a:r>
-              <a:rPr lang="en-US" sz="1050" dirty="0" err="1">
-                <a:solidFill>
-                  <a:srgbClr val="000000"/>
-                </a:solidFill>
-                <a:highlight>
-                  <a:srgbClr val="FFFFFF"/>
-                </a:highlight>
-                <a:latin typeface="Consolas" panose="020B0609020204030204" pitchFamily="49" charset="0"/>
-              </a:rPr>
-              <a:t>cluster</a:t>
-            </a:r>
-            <a:r>
-              <a:rPr lang="en-US" sz="1050" b="1" dirty="0" err="1">
-                <a:solidFill>
-                  <a:srgbClr val="000080"/>
-                </a:solidFill>
-                <a:highlight>
-                  <a:srgbClr val="FFFFFF"/>
-                </a:highlight>
-                <a:latin typeface="Consolas" panose="020B0609020204030204" pitchFamily="49" charset="0"/>
-              </a:rPr>
-              <a:t>.</a:t>
-            </a:r>
-            <a:r>
-              <a:rPr lang="en-US" sz="1050" dirty="0" err="1">
-                <a:solidFill>
-                  <a:srgbClr val="000000"/>
-                </a:solidFill>
-                <a:highlight>
-                  <a:srgbClr val="FFFFFF"/>
-                </a:highlight>
-                <a:latin typeface="Consolas" panose="020B0609020204030204" pitchFamily="49" charset="0"/>
-              </a:rPr>
-              <a:t>openBucket</a:t>
-            </a:r>
-            <a:r>
-              <a:rPr lang="en-US" sz="1050" b="1" dirty="0">
-                <a:solidFill>
-                  <a:srgbClr val="000080"/>
-                </a:solidFill>
-                <a:highlight>
-                  <a:srgbClr val="FFFFFF"/>
-                </a:highlight>
-                <a:latin typeface="Consolas" panose="020B0609020204030204" pitchFamily="49" charset="0"/>
-              </a:rPr>
-              <a:t>(</a:t>
-            </a:r>
-            <a:r>
-              <a:rPr lang="en-US" sz="1050" dirty="0">
-                <a:solidFill>
-                  <a:srgbClr val="808080"/>
-                </a:solidFill>
-                <a:highlight>
-                  <a:srgbClr val="FFFFFF"/>
-                </a:highlight>
-                <a:latin typeface="Consolas" panose="020B0609020204030204" pitchFamily="49" charset="0"/>
-              </a:rPr>
-              <a:t>"default"</a:t>
-            </a:r>
-            <a:r>
-              <a:rPr lang="en-US" sz="1050" b="1" dirty="0">
-                <a:solidFill>
-                  <a:srgbClr val="000080"/>
-                </a:solidFill>
-                <a:highlight>
-                  <a:srgbClr val="FFFFFF"/>
-                </a:highlight>
-                <a:latin typeface="Consolas" panose="020B0609020204030204" pitchFamily="49" charset="0"/>
-              </a:rPr>
-              <a:t>);</a:t>
-            </a:r>
-            <a:endParaRPr lang="en-US" sz="1050" dirty="0">
-              <a:solidFill>
-                <a:srgbClr val="000000"/>
-              </a:solidFill>
-              <a:highlight>
-                <a:srgbClr val="FFFFFF"/>
-              </a:highlight>
-              <a:latin typeface="Consolas" panose="020B0609020204030204" pitchFamily="49" charset="0"/>
-            </a:endParaRPr>
-          </a:p>
-          <a:p>
-            <a:endParaRPr lang="en-US" sz="1050" dirty="0">
-              <a:solidFill>
-                <a:srgbClr val="000000"/>
-              </a:solidFill>
-              <a:highlight>
-                <a:srgbClr val="FFFFFF"/>
-              </a:highlight>
-              <a:latin typeface="Consolas" panose="020B0609020204030204" pitchFamily="49" charset="0"/>
-            </a:endParaRPr>
-          </a:p>
-          <a:p>
-            <a:r>
-              <a:rPr lang="en-US" sz="1050" dirty="0">
-                <a:solidFill>
-                  <a:srgbClr val="008000"/>
-                </a:solidFill>
-                <a:highlight>
-                  <a:srgbClr val="FFFFFF"/>
-                </a:highlight>
-                <a:latin typeface="Consolas" panose="020B0609020204030204" pitchFamily="49" charset="0"/>
-              </a:rPr>
-              <a:t>// preparing N1QL</a:t>
-            </a:r>
-          </a:p>
-          <a:p>
-            <a:r>
-              <a:rPr lang="en-US" sz="1050" dirty="0">
-                <a:solidFill>
-                  <a:srgbClr val="000000"/>
-                </a:solidFill>
-                <a:highlight>
-                  <a:srgbClr val="FFFFFF"/>
-                </a:highlight>
-                <a:latin typeface="Consolas" panose="020B0609020204030204" pitchFamily="49" charset="0"/>
-              </a:rPr>
-              <a:t>N1qlQuery query </a:t>
-            </a:r>
-            <a:r>
-              <a:rPr lang="en-US" sz="1050" b="1" dirty="0">
-                <a:solidFill>
-                  <a:srgbClr val="000080"/>
-                </a:solidFill>
-                <a:highlight>
-                  <a:srgbClr val="FFFFFF"/>
-                </a:highlight>
-                <a:latin typeface="Consolas" panose="020B0609020204030204" pitchFamily="49" charset="0"/>
-              </a:rPr>
-              <a:t>=</a:t>
-            </a:r>
-            <a:r>
-              <a:rPr lang="en-US" sz="1050" dirty="0">
-                <a:solidFill>
-                  <a:srgbClr val="000000"/>
-                </a:solidFill>
-                <a:highlight>
-                  <a:srgbClr val="FFFFFF"/>
-                </a:highlight>
-                <a:latin typeface="Consolas" panose="020B0609020204030204" pitchFamily="49" charset="0"/>
-              </a:rPr>
-              <a:t>  N1qlQuery</a:t>
-            </a:r>
-            <a:r>
-              <a:rPr lang="en-US" sz="1050" b="1" dirty="0">
-                <a:solidFill>
-                  <a:srgbClr val="000080"/>
-                </a:solidFill>
-                <a:highlight>
-                  <a:srgbClr val="FFFFFF"/>
-                </a:highlight>
-                <a:latin typeface="Consolas" panose="020B0609020204030204" pitchFamily="49" charset="0"/>
-              </a:rPr>
-              <a:t>.</a:t>
-            </a:r>
-            <a:r>
-              <a:rPr lang="en-US" sz="1050" dirty="0">
-                <a:solidFill>
-                  <a:srgbClr val="000000"/>
-                </a:solidFill>
-                <a:highlight>
-                  <a:srgbClr val="FFFFFF"/>
-                </a:highlight>
-                <a:latin typeface="Consolas" panose="020B0609020204030204" pitchFamily="49" charset="0"/>
-              </a:rPr>
-              <a:t>parameterized</a:t>
-            </a:r>
-            <a:r>
-              <a:rPr lang="en-US" sz="1050" b="1" dirty="0">
-                <a:solidFill>
-                  <a:srgbClr val="000080"/>
-                </a:solidFill>
-                <a:highlight>
-                  <a:srgbClr val="FFFFFF"/>
-                </a:highlight>
-                <a:latin typeface="Consolas" panose="020B0609020204030204" pitchFamily="49" charset="0"/>
-              </a:rPr>
-              <a:t>(</a:t>
-            </a:r>
-            <a:r>
-              <a:rPr lang="en-US" sz="1050" dirty="0">
-                <a:solidFill>
-                  <a:srgbClr val="000000"/>
-                </a:solidFill>
-                <a:highlight>
-                  <a:srgbClr val="FFFFFF"/>
-                </a:highlight>
-                <a:latin typeface="Consolas" panose="020B0609020204030204" pitchFamily="49" charset="0"/>
-              </a:rPr>
-              <a:t>“SELECT </a:t>
-            </a:r>
-            <a:r>
-              <a:rPr lang="en-US" sz="1050" b="1" dirty="0">
-                <a:solidFill>
-                  <a:srgbClr val="000080"/>
-                </a:solidFill>
-                <a:highlight>
-                  <a:srgbClr val="FFFFFF"/>
-                </a:highlight>
-                <a:latin typeface="Consolas" panose="020B0609020204030204" pitchFamily="49" charset="0"/>
-              </a:rPr>
-              <a:t>*</a:t>
-            </a:r>
-            <a:r>
-              <a:rPr lang="en-US" sz="1050" dirty="0">
-                <a:solidFill>
-                  <a:srgbClr val="000000"/>
-                </a:solidFill>
-                <a:highlight>
-                  <a:srgbClr val="FFFFFF"/>
-                </a:highlight>
-                <a:latin typeface="Consolas" panose="020B0609020204030204" pitchFamily="49" charset="0"/>
-              </a:rPr>
-              <a:t> FROM `travel</a:t>
-            </a:r>
-            <a:r>
-              <a:rPr lang="en-US" sz="1050" b="1" dirty="0">
-                <a:solidFill>
-                  <a:srgbClr val="000080"/>
-                </a:solidFill>
-                <a:highlight>
-                  <a:srgbClr val="FFFFFF"/>
-                </a:highlight>
-                <a:latin typeface="Consolas" panose="020B0609020204030204" pitchFamily="49" charset="0"/>
-              </a:rPr>
-              <a:t>-</a:t>
-            </a:r>
-            <a:r>
-              <a:rPr lang="en-US" sz="1050" dirty="0">
-                <a:solidFill>
-                  <a:srgbClr val="000000"/>
-                </a:solidFill>
-                <a:highlight>
-                  <a:srgbClr val="FFFFFF"/>
-                </a:highlight>
-                <a:latin typeface="Consolas" panose="020B0609020204030204" pitchFamily="49" charset="0"/>
-              </a:rPr>
-              <a:t>sample`”</a:t>
-            </a:r>
-            <a:r>
-              <a:rPr lang="en-US" sz="1050" b="1" dirty="0">
-                <a:solidFill>
-                  <a:srgbClr val="000080"/>
-                </a:solidFill>
-                <a:highlight>
-                  <a:srgbClr val="FFFFFF"/>
-                </a:highlight>
-                <a:latin typeface="Consolas" panose="020B0609020204030204" pitchFamily="49" charset="0"/>
-              </a:rPr>
-              <a:t>);</a:t>
-            </a:r>
-            <a:endParaRPr lang="en-US" sz="1050" dirty="0">
-              <a:solidFill>
-                <a:srgbClr val="000000"/>
-              </a:solidFill>
-              <a:highlight>
-                <a:srgbClr val="FFFFFF"/>
-              </a:highlight>
-              <a:latin typeface="Consolas" panose="020B0609020204030204" pitchFamily="49" charset="0"/>
-            </a:endParaRPr>
-          </a:p>
-          <a:p>
-            <a:endParaRPr lang="en-US" sz="1050" dirty="0">
-              <a:solidFill>
-                <a:srgbClr val="000000"/>
-              </a:solidFill>
-              <a:highlight>
-                <a:srgbClr val="FFFFFF"/>
-              </a:highlight>
-              <a:latin typeface="Consolas" panose="020B0609020204030204" pitchFamily="49" charset="0"/>
-            </a:endParaRPr>
-          </a:p>
-          <a:p>
-            <a:r>
-              <a:rPr lang="en-US" sz="1050" dirty="0">
-                <a:solidFill>
-                  <a:srgbClr val="008000"/>
-                </a:solidFill>
-                <a:highlight>
-                  <a:srgbClr val="FFFFFF"/>
-                </a:highlight>
-                <a:latin typeface="Consolas" panose="020B0609020204030204" pitchFamily="49" charset="0"/>
-              </a:rPr>
-              <a:t>// creating and saving a document</a:t>
-            </a:r>
-          </a:p>
-          <a:p>
-            <a:r>
-              <a:rPr lang="en-US" sz="1050" dirty="0" err="1">
-                <a:solidFill>
-                  <a:srgbClr val="000000"/>
-                </a:solidFill>
-                <a:highlight>
-                  <a:srgbClr val="FFFFFF"/>
-                </a:highlight>
-                <a:latin typeface="Consolas" panose="020B0609020204030204" pitchFamily="49" charset="0"/>
-              </a:rPr>
-              <a:t>JsonObject</a:t>
-            </a:r>
-            <a:r>
-              <a:rPr lang="en-US" sz="1050" dirty="0">
-                <a:solidFill>
-                  <a:srgbClr val="000000"/>
-                </a:solidFill>
-                <a:highlight>
-                  <a:srgbClr val="FFFFFF"/>
-                </a:highlight>
-                <a:latin typeface="Consolas" panose="020B0609020204030204" pitchFamily="49" charset="0"/>
-              </a:rPr>
-              <a:t> person </a:t>
-            </a:r>
-            <a:r>
-              <a:rPr lang="en-US" sz="1050" b="1" dirty="0">
-                <a:solidFill>
-                  <a:srgbClr val="000080"/>
-                </a:solidFill>
-                <a:highlight>
-                  <a:srgbClr val="FFFFFF"/>
-                </a:highlight>
-                <a:latin typeface="Consolas" panose="020B0609020204030204" pitchFamily="49" charset="0"/>
-              </a:rPr>
-              <a:t>=</a:t>
-            </a:r>
-            <a:r>
-              <a:rPr lang="en-US" sz="1050" dirty="0">
-                <a:solidFill>
-                  <a:srgbClr val="000000"/>
-                </a:solidFill>
-                <a:highlight>
-                  <a:srgbClr val="FFFFFF"/>
-                </a:highlight>
-                <a:latin typeface="Consolas" panose="020B0609020204030204" pitchFamily="49" charset="0"/>
-              </a:rPr>
-              <a:t> </a:t>
-            </a:r>
-            <a:r>
-              <a:rPr lang="en-US" sz="1050" dirty="0" err="1">
-                <a:solidFill>
-                  <a:srgbClr val="000000"/>
-                </a:solidFill>
-                <a:highlight>
-                  <a:srgbClr val="FFFFFF"/>
-                </a:highlight>
-                <a:latin typeface="Consolas" panose="020B0609020204030204" pitchFamily="49" charset="0"/>
-              </a:rPr>
-              <a:t>JsonObject</a:t>
-            </a:r>
-            <a:r>
-              <a:rPr lang="en-US" sz="1050" b="1" dirty="0" err="1">
-                <a:solidFill>
-                  <a:srgbClr val="000080"/>
-                </a:solidFill>
-                <a:highlight>
-                  <a:srgbClr val="FFFFFF"/>
-                </a:highlight>
-                <a:latin typeface="Consolas" panose="020B0609020204030204" pitchFamily="49" charset="0"/>
-              </a:rPr>
-              <a:t>.</a:t>
-            </a:r>
-            <a:r>
-              <a:rPr lang="en-US" sz="1050" dirty="0" err="1">
-                <a:solidFill>
-                  <a:srgbClr val="000000"/>
-                </a:solidFill>
-                <a:highlight>
-                  <a:srgbClr val="FFFFFF"/>
-                </a:highlight>
-                <a:latin typeface="Consolas" panose="020B0609020204030204" pitchFamily="49" charset="0"/>
-              </a:rPr>
-              <a:t>create</a:t>
-            </a:r>
-            <a:r>
-              <a:rPr lang="en-US" sz="1050" b="1" dirty="0">
-                <a:solidFill>
-                  <a:srgbClr val="000080"/>
-                </a:solidFill>
-                <a:highlight>
-                  <a:srgbClr val="FFFFFF"/>
-                </a:highlight>
-                <a:latin typeface="Consolas" panose="020B0609020204030204" pitchFamily="49" charset="0"/>
-              </a:rPr>
-              <a:t>()</a:t>
-            </a:r>
-            <a:endParaRPr lang="en-US" sz="1050" dirty="0">
-              <a:solidFill>
-                <a:srgbClr val="000000"/>
-              </a:solidFill>
-              <a:highlight>
-                <a:srgbClr val="FFFFFF"/>
-              </a:highlight>
-              <a:latin typeface="Consolas" panose="020B0609020204030204" pitchFamily="49" charset="0"/>
-            </a:endParaRPr>
-          </a:p>
-          <a:p>
-            <a:r>
-              <a:rPr lang="en-US" sz="1050" dirty="0">
-                <a:solidFill>
-                  <a:srgbClr val="000000"/>
-                </a:solidFill>
-                <a:highlight>
-                  <a:srgbClr val="FFFFFF"/>
-                </a:highlight>
-                <a:latin typeface="Consolas" panose="020B0609020204030204" pitchFamily="49" charset="0"/>
-              </a:rPr>
-              <a:t>                </a:t>
-            </a:r>
-            <a:r>
-              <a:rPr lang="en-US" sz="1050" b="1" dirty="0">
-                <a:solidFill>
-                  <a:srgbClr val="000080"/>
-                </a:solidFill>
-                <a:highlight>
-                  <a:srgbClr val="FFFFFF"/>
-                </a:highlight>
-                <a:latin typeface="Consolas" panose="020B0609020204030204" pitchFamily="49" charset="0"/>
-              </a:rPr>
-              <a:t>.</a:t>
-            </a:r>
-            <a:r>
-              <a:rPr lang="en-US" sz="1050" dirty="0">
-                <a:solidFill>
-                  <a:srgbClr val="000000"/>
-                </a:solidFill>
-                <a:highlight>
-                  <a:srgbClr val="FFFFFF"/>
-                </a:highlight>
-                <a:latin typeface="Consolas" panose="020B0609020204030204" pitchFamily="49" charset="0"/>
-              </a:rPr>
-              <a:t>put</a:t>
-            </a:r>
-            <a:r>
-              <a:rPr lang="en-US" sz="1050" b="1" dirty="0">
-                <a:solidFill>
-                  <a:srgbClr val="000080"/>
-                </a:solidFill>
-                <a:highlight>
-                  <a:srgbClr val="FFFFFF"/>
-                </a:highlight>
-                <a:latin typeface="Consolas" panose="020B0609020204030204" pitchFamily="49" charset="0"/>
-              </a:rPr>
-              <a:t>(</a:t>
-            </a:r>
-            <a:r>
-              <a:rPr lang="en-US" sz="1050" dirty="0">
-                <a:solidFill>
-                  <a:srgbClr val="808080"/>
-                </a:solidFill>
-                <a:highlight>
-                  <a:srgbClr val="FFFFFF"/>
-                </a:highlight>
-                <a:latin typeface="Consolas" panose="020B0609020204030204" pitchFamily="49" charset="0"/>
-              </a:rPr>
-              <a:t>"</a:t>
-            </a:r>
-            <a:r>
-              <a:rPr lang="en-US" sz="1050" dirty="0" err="1">
-                <a:solidFill>
-                  <a:srgbClr val="808080"/>
-                </a:solidFill>
-                <a:highlight>
-                  <a:srgbClr val="FFFFFF"/>
-                </a:highlight>
-                <a:latin typeface="Consolas" panose="020B0609020204030204" pitchFamily="49" charset="0"/>
-              </a:rPr>
-              <a:t>firstName</a:t>
-            </a:r>
-            <a:r>
-              <a:rPr lang="en-US" sz="1050" dirty="0">
-                <a:solidFill>
-                  <a:srgbClr val="808080"/>
-                </a:solidFill>
-                <a:highlight>
-                  <a:srgbClr val="FFFFFF"/>
-                </a:highlight>
-                <a:latin typeface="Consolas" panose="020B0609020204030204" pitchFamily="49" charset="0"/>
-              </a:rPr>
-              <a:t>"</a:t>
-            </a:r>
-            <a:r>
-              <a:rPr lang="en-US" sz="1050" b="1" dirty="0">
-                <a:solidFill>
-                  <a:srgbClr val="000080"/>
-                </a:solidFill>
-                <a:highlight>
-                  <a:srgbClr val="FFFFFF"/>
-                </a:highlight>
-                <a:latin typeface="Consolas" panose="020B0609020204030204" pitchFamily="49" charset="0"/>
-              </a:rPr>
-              <a:t>,</a:t>
-            </a:r>
-            <a:r>
-              <a:rPr lang="en-US" sz="1050" dirty="0">
-                <a:solidFill>
-                  <a:srgbClr val="000000"/>
-                </a:solidFill>
-                <a:highlight>
-                  <a:srgbClr val="FFFFFF"/>
-                </a:highlight>
-                <a:latin typeface="Consolas" panose="020B0609020204030204" pitchFamily="49" charset="0"/>
-              </a:rPr>
-              <a:t> </a:t>
-            </a:r>
-            <a:r>
-              <a:rPr lang="en-US" sz="1050" dirty="0">
-                <a:solidFill>
-                  <a:srgbClr val="808080"/>
-                </a:solidFill>
-                <a:highlight>
-                  <a:srgbClr val="FFFFFF"/>
-                </a:highlight>
-                <a:latin typeface="Consolas" panose="020B0609020204030204" pitchFamily="49" charset="0"/>
-              </a:rPr>
-              <a:t>"John"</a:t>
-            </a:r>
-            <a:r>
-              <a:rPr lang="en-US" sz="1050" b="1" dirty="0">
-                <a:solidFill>
-                  <a:srgbClr val="000080"/>
-                </a:solidFill>
-                <a:highlight>
-                  <a:srgbClr val="FFFFFF"/>
-                </a:highlight>
-                <a:latin typeface="Consolas" panose="020B0609020204030204" pitchFamily="49" charset="0"/>
-              </a:rPr>
-              <a:t>)</a:t>
-            </a:r>
-            <a:endParaRPr lang="en-US" sz="1050" dirty="0">
-              <a:solidFill>
-                <a:srgbClr val="000000"/>
-              </a:solidFill>
-              <a:highlight>
-                <a:srgbClr val="FFFFFF"/>
-              </a:highlight>
-              <a:latin typeface="Consolas" panose="020B0609020204030204" pitchFamily="49" charset="0"/>
-            </a:endParaRPr>
-          </a:p>
-          <a:p>
-            <a:r>
-              <a:rPr lang="en-US" sz="1050" dirty="0">
-                <a:solidFill>
-                  <a:srgbClr val="000000"/>
-                </a:solidFill>
-                <a:highlight>
-                  <a:srgbClr val="FFFFFF"/>
-                </a:highlight>
-                <a:latin typeface="Consolas" panose="020B0609020204030204" pitchFamily="49" charset="0"/>
-              </a:rPr>
-              <a:t>                </a:t>
-            </a:r>
-            <a:r>
-              <a:rPr lang="en-US" sz="1050" b="1" dirty="0">
-                <a:solidFill>
-                  <a:srgbClr val="000080"/>
-                </a:solidFill>
-                <a:highlight>
-                  <a:srgbClr val="FFFFFF"/>
-                </a:highlight>
-                <a:latin typeface="Consolas" panose="020B0609020204030204" pitchFamily="49" charset="0"/>
-              </a:rPr>
-              <a:t>.</a:t>
-            </a:r>
-            <a:r>
-              <a:rPr lang="en-US" sz="1050" dirty="0">
-                <a:solidFill>
-                  <a:srgbClr val="000000"/>
-                </a:solidFill>
-                <a:highlight>
-                  <a:srgbClr val="FFFFFF"/>
-                </a:highlight>
-                <a:latin typeface="Consolas" panose="020B0609020204030204" pitchFamily="49" charset="0"/>
-              </a:rPr>
-              <a:t>put</a:t>
-            </a:r>
-            <a:r>
-              <a:rPr lang="en-US" sz="1050" b="1" dirty="0">
-                <a:solidFill>
-                  <a:srgbClr val="000080"/>
-                </a:solidFill>
-                <a:highlight>
-                  <a:srgbClr val="FFFFFF"/>
-                </a:highlight>
-                <a:latin typeface="Consolas" panose="020B0609020204030204" pitchFamily="49" charset="0"/>
-              </a:rPr>
-              <a:t>(</a:t>
-            </a:r>
-            <a:r>
-              <a:rPr lang="en-US" sz="1050" dirty="0">
-                <a:solidFill>
-                  <a:srgbClr val="808080"/>
-                </a:solidFill>
-                <a:highlight>
-                  <a:srgbClr val="FFFFFF"/>
-                </a:highlight>
-                <a:latin typeface="Consolas" panose="020B0609020204030204" pitchFamily="49" charset="0"/>
-              </a:rPr>
-              <a:t>"</a:t>
-            </a:r>
-            <a:r>
-              <a:rPr lang="en-US" sz="1050" dirty="0" err="1">
-                <a:solidFill>
-                  <a:srgbClr val="808080"/>
-                </a:solidFill>
-                <a:highlight>
-                  <a:srgbClr val="FFFFFF"/>
-                </a:highlight>
-                <a:latin typeface="Consolas" panose="020B0609020204030204" pitchFamily="49" charset="0"/>
-              </a:rPr>
-              <a:t>lastName</a:t>
-            </a:r>
-            <a:r>
-              <a:rPr lang="en-US" sz="1050" dirty="0">
-                <a:solidFill>
-                  <a:srgbClr val="808080"/>
-                </a:solidFill>
-                <a:highlight>
-                  <a:srgbClr val="FFFFFF"/>
-                </a:highlight>
-                <a:latin typeface="Consolas" panose="020B0609020204030204" pitchFamily="49" charset="0"/>
-              </a:rPr>
-              <a:t>"</a:t>
-            </a:r>
-            <a:r>
-              <a:rPr lang="en-US" sz="1050" b="1" dirty="0">
-                <a:solidFill>
-                  <a:srgbClr val="000080"/>
-                </a:solidFill>
-                <a:highlight>
-                  <a:srgbClr val="FFFFFF"/>
-                </a:highlight>
-                <a:latin typeface="Consolas" panose="020B0609020204030204" pitchFamily="49" charset="0"/>
-              </a:rPr>
-              <a:t>,</a:t>
-            </a:r>
-            <a:r>
-              <a:rPr lang="en-US" sz="1050" dirty="0">
-                <a:solidFill>
-                  <a:srgbClr val="000000"/>
-                </a:solidFill>
-                <a:highlight>
-                  <a:srgbClr val="FFFFFF"/>
-                </a:highlight>
-                <a:latin typeface="Consolas" panose="020B0609020204030204" pitchFamily="49" charset="0"/>
-              </a:rPr>
-              <a:t> </a:t>
-            </a:r>
-            <a:r>
-              <a:rPr lang="en-US" sz="1050" dirty="0">
-                <a:solidFill>
-                  <a:srgbClr val="808080"/>
-                </a:solidFill>
-                <a:highlight>
-                  <a:srgbClr val="FFFFFF"/>
-                </a:highlight>
-                <a:latin typeface="Consolas" panose="020B0609020204030204" pitchFamily="49" charset="0"/>
-              </a:rPr>
-              <a:t>"Doe"</a:t>
-            </a:r>
-            <a:r>
-              <a:rPr lang="en-US" sz="1050" b="1" dirty="0">
-                <a:solidFill>
-                  <a:srgbClr val="000080"/>
-                </a:solidFill>
-                <a:highlight>
-                  <a:srgbClr val="FFFFFF"/>
-                </a:highlight>
-                <a:latin typeface="Consolas" panose="020B0609020204030204" pitchFamily="49" charset="0"/>
-              </a:rPr>
-              <a:t>);</a:t>
-            </a:r>
-            <a:endParaRPr lang="en-US" sz="1050" dirty="0">
-              <a:solidFill>
-                <a:srgbClr val="000000"/>
-              </a:solidFill>
-              <a:highlight>
-                <a:srgbClr val="FFFFFF"/>
-              </a:highlight>
-              <a:latin typeface="Consolas" panose="020B0609020204030204" pitchFamily="49" charset="0"/>
-            </a:endParaRPr>
-          </a:p>
-          <a:p>
-            <a:r>
-              <a:rPr lang="en-US" sz="1050" dirty="0" err="1">
-                <a:solidFill>
-                  <a:srgbClr val="000000"/>
-                </a:solidFill>
-                <a:highlight>
-                  <a:srgbClr val="FFFFFF"/>
-                </a:highlight>
-                <a:latin typeface="Consolas" panose="020B0609020204030204" pitchFamily="49" charset="0"/>
-              </a:rPr>
-              <a:t>bucket</a:t>
-            </a:r>
-            <a:r>
-              <a:rPr lang="en-US" sz="1050" b="1" dirty="0" err="1">
-                <a:solidFill>
-                  <a:srgbClr val="000080"/>
-                </a:solidFill>
-                <a:highlight>
-                  <a:srgbClr val="FFFFFF"/>
-                </a:highlight>
-                <a:latin typeface="Consolas" panose="020B0609020204030204" pitchFamily="49" charset="0"/>
-              </a:rPr>
-              <a:t>.</a:t>
-            </a:r>
-            <a:r>
-              <a:rPr lang="en-US" sz="1050" dirty="0" err="1">
-                <a:solidFill>
-                  <a:srgbClr val="000000"/>
-                </a:solidFill>
-                <a:highlight>
-                  <a:srgbClr val="FFFFFF"/>
-                </a:highlight>
-                <a:latin typeface="Consolas" panose="020B0609020204030204" pitchFamily="49" charset="0"/>
-              </a:rPr>
-              <a:t>upsert</a:t>
-            </a:r>
-            <a:r>
-              <a:rPr lang="en-US" sz="1050" b="1" dirty="0">
-                <a:solidFill>
-                  <a:srgbClr val="000080"/>
-                </a:solidFill>
-                <a:highlight>
-                  <a:srgbClr val="FFFFFF"/>
-                </a:highlight>
-                <a:latin typeface="Consolas" panose="020B0609020204030204" pitchFamily="49" charset="0"/>
-              </a:rPr>
-              <a:t>(</a:t>
-            </a:r>
-            <a:r>
-              <a:rPr lang="en-US" sz="1050" dirty="0" err="1">
-                <a:solidFill>
-                  <a:srgbClr val="000000"/>
-                </a:solidFill>
-                <a:highlight>
-                  <a:srgbClr val="FFFFFF"/>
-                </a:highlight>
-                <a:latin typeface="Consolas" panose="020B0609020204030204" pitchFamily="49" charset="0"/>
-              </a:rPr>
-              <a:t>JsonDocument</a:t>
-            </a:r>
-            <a:r>
-              <a:rPr lang="en-US" sz="1050" b="1" dirty="0" err="1">
-                <a:solidFill>
-                  <a:srgbClr val="000080"/>
-                </a:solidFill>
-                <a:highlight>
-                  <a:srgbClr val="FFFFFF"/>
-                </a:highlight>
-                <a:latin typeface="Consolas" panose="020B0609020204030204" pitchFamily="49" charset="0"/>
-              </a:rPr>
-              <a:t>.</a:t>
-            </a:r>
-            <a:r>
-              <a:rPr lang="en-US" sz="1050" dirty="0" err="1">
-                <a:solidFill>
-                  <a:srgbClr val="000000"/>
-                </a:solidFill>
-                <a:highlight>
-                  <a:srgbClr val="FFFFFF"/>
-                </a:highlight>
-                <a:latin typeface="Consolas" panose="020B0609020204030204" pitchFamily="49" charset="0"/>
-              </a:rPr>
-              <a:t>create</a:t>
-            </a:r>
-            <a:r>
-              <a:rPr lang="en-US" sz="1050" b="1" dirty="0">
-                <a:solidFill>
-                  <a:srgbClr val="000080"/>
-                </a:solidFill>
-                <a:highlight>
-                  <a:srgbClr val="FFFFFF"/>
-                </a:highlight>
-                <a:latin typeface="Consolas" panose="020B0609020204030204" pitchFamily="49" charset="0"/>
-              </a:rPr>
-              <a:t>(</a:t>
-            </a:r>
-            <a:r>
-              <a:rPr lang="en-US" sz="1050" dirty="0">
-                <a:solidFill>
-                  <a:srgbClr val="000000"/>
-                </a:solidFill>
-                <a:highlight>
-                  <a:srgbClr val="FFFFFF"/>
-                </a:highlight>
-                <a:latin typeface="Consolas" panose="020B0609020204030204" pitchFamily="49" charset="0"/>
-              </a:rPr>
-              <a:t>key</a:t>
-            </a:r>
-            <a:r>
-              <a:rPr lang="en-US" sz="1050" b="1" dirty="0">
-                <a:solidFill>
-                  <a:srgbClr val="000080"/>
-                </a:solidFill>
-                <a:highlight>
-                  <a:srgbClr val="FFFFFF"/>
-                </a:highlight>
-                <a:latin typeface="Consolas" panose="020B0609020204030204" pitchFamily="49" charset="0"/>
-              </a:rPr>
-              <a:t>,</a:t>
-            </a:r>
-            <a:r>
-              <a:rPr lang="en-US" sz="1050" dirty="0">
-                <a:solidFill>
-                  <a:srgbClr val="000000"/>
-                </a:solidFill>
-                <a:highlight>
-                  <a:srgbClr val="FFFFFF"/>
-                </a:highlight>
-                <a:latin typeface="Consolas" panose="020B0609020204030204" pitchFamily="49" charset="0"/>
-              </a:rPr>
-              <a:t> person</a:t>
-            </a:r>
-            <a:r>
-              <a:rPr lang="en-US" sz="1050" b="1" dirty="0">
-                <a:solidFill>
-                  <a:srgbClr val="000080"/>
-                </a:solidFill>
-                <a:highlight>
-                  <a:srgbClr val="FFFFFF"/>
-                </a:highlight>
-                <a:latin typeface="Consolas" panose="020B0609020204030204" pitchFamily="49" charset="0"/>
-              </a:rPr>
-              <a:t>));</a:t>
-            </a:r>
-            <a:endParaRPr lang="en-US" sz="1050" dirty="0">
-              <a:solidFill>
-                <a:srgbClr val="000000"/>
-              </a:solidFill>
-              <a:highlight>
-                <a:srgbClr val="FFFFFF"/>
-              </a:highlight>
-              <a:latin typeface="Consolas" panose="020B0609020204030204" pitchFamily="49" charset="0"/>
-            </a:endParaRPr>
-          </a:p>
-        </p:txBody>
-      </p:sp>
-    </p:spTree>
-    <p:extLst>
-      <p:ext uri="{BB962C8B-B14F-4D97-AF65-F5344CB8AC3E}">
-        <p14:creationId xmlns:p14="http://schemas.microsoft.com/office/powerpoint/2010/main" val="1324995767"/>
-      </p:ext>
-    </p:extLst>
-  </p:cSld>
-  <p:clrMapOvr>
-    <a:masterClrMapping/>
-  </p:clrMapOvr>
-</p:sld>
-</file>
-
-<file path=ppt/slides/slide16.xml><?xml version="1.0" encoding="utf-8"?>
-<p:sld xmlns:a="http://schemas.openxmlformats.org/drawingml/2006/main" xmlns:r="http://schemas.openxmlformats.org/officeDocument/2006/relationships" xmlns:p="http://schemas.openxmlformats.org/presentationml/2006/main">
-  <p:cSld>
-    <p:spTree>
-      <p:nvGrpSpPr>
-        <p:cNvPr id="1" name=""/>
-        <p:cNvGrpSpPr/>
-        <p:nvPr/>
-      </p:nvGrpSpPr>
-      <p:grpSpPr>
-        <a:xfrm>
-          <a:off x="0" y="0"/>
-          <a:ext cx="0" cy="0"/>
-          <a:chOff x="0" y="0"/>
-          <a:chExt cx="0" cy="0"/>
-        </a:xfrm>
-      </p:grpSpPr>
-      <p:sp>
-        <p:nvSpPr>
-          <p:cNvPr id="2" name="Title 1"/>
-          <p:cNvSpPr>
-            <a:spLocks noGrp="1"/>
-          </p:cNvSpPr>
-          <p:nvPr>
             <p:ph type="ctrTitle"/>
           </p:nvPr>
         </p:nvSpPr>
@@ -12143,14 +9282,12 @@
             </a:pPr>
             <a:r>
               <a:rPr lang="en-US" dirty="0"/>
-              <a:t>Using the SDK (.NET / Java / Node)</a:t>
-            </a:r>
-          </a:p>
-          <a:p>
-            <a:pPr marL="342900" indent="-342900">
-              <a:buFont typeface="Arial" charset="0"/>
-              <a:buChar char="•"/>
-            </a:pPr>
+              <a:t>Using the </a:t>
+            </a:r>
+            <a:r>
+              <a:rPr lang="en-US" dirty="0" smtClean="0"/>
+              <a:t>.NET SDK</a:t>
+            </a:r>
             <a:endParaRPr lang="en-US" dirty="0"/>
           </a:p>
           <a:p>
@@ -12265,9 +9402,15 @@
               <a:rPr lang="en-US" dirty="0">
                 <a:hlinkClick r:id="rId3"/>
               </a:rPr>
-              <a:t>https://github.com/couchbaselabs/workshop</a:t>
-            </a:r>
-            <a:endParaRPr lang="en-US" dirty="0"/>
+              <a:t>https://</a:t>
+            </a:r>
+            <a:r>
+              <a:rPr lang="en-US" dirty="0" smtClean="0">
+                <a:hlinkClick r:id="rId3"/>
+              </a:rPr>
+              <a:t>github.com/couchbaselabs/aspnet-nosql-workshop</a:t>
+            </a:r>
+            <a:endParaRPr lang="en-US" dirty="0" smtClean="0"/>
           </a:p>
           <a:p>
             <a:pPr marL="342900" indent="-342900">

</xml_diff>